<commit_message>
exploratory data+new Seurat+cell type annotations
</commit_message>
<xml_diff>
--- a/my_notes.pptx
+++ b/my_notes.pptx
@@ -5,7 +5,7 @@
     <p:sldMasterId id="2147483648" r:id="rId1"/>
   </p:sldMasterIdLst>
   <p:notesMasterIdLst>
-    <p:notesMasterId r:id="rId27"/>
+    <p:notesMasterId r:id="rId34"/>
   </p:notesMasterIdLst>
   <p:sldIdLst>
     <p:sldId id="256" r:id="rId2"/>
@@ -24,15 +24,22 @@
     <p:sldId id="267" r:id="rId15"/>
     <p:sldId id="270" r:id="rId16"/>
     <p:sldId id="271" r:id="rId17"/>
-    <p:sldId id="281" r:id="rId18"/>
-    <p:sldId id="282" r:id="rId19"/>
+    <p:sldId id="286" r:id="rId18"/>
+    <p:sldId id="281" r:id="rId19"/>
     <p:sldId id="272" r:id="rId20"/>
     <p:sldId id="278" r:id="rId21"/>
     <p:sldId id="273" r:id="rId22"/>
     <p:sldId id="274" r:id="rId23"/>
     <p:sldId id="280" r:id="rId24"/>
     <p:sldId id="275" r:id="rId25"/>
-    <p:sldId id="279" r:id="rId26"/>
+    <p:sldId id="291" r:id="rId26"/>
+    <p:sldId id="288" r:id="rId27"/>
+    <p:sldId id="279" r:id="rId28"/>
+    <p:sldId id="283" r:id="rId29"/>
+    <p:sldId id="284" r:id="rId30"/>
+    <p:sldId id="285" r:id="rId31"/>
+    <p:sldId id="289" r:id="rId32"/>
+    <p:sldId id="290" r:id="rId33"/>
   </p:sldIdLst>
   <p:sldSz cx="12192000" cy="6858000"/>
   <p:notesSz cx="6858000" cy="9144000"/>
@@ -2740,7 +2747,7 @@
           <a:p>
             <a:fld id="{388B1555-F4E9-5F41-9F32-9C0D89BD75B5}" type="datetimeFigureOut">
               <a:rPr lang="en-IL" smtClean="0"/>
-              <a:t>14/04/2023</a:t>
+              <a:t>21/04/2023</a:t>
             </a:fld>
             <a:endParaRPr lang="en-IL"/>
           </a:p>
@@ -3341,19 +3348,11 @@
           <a:p>
             <a:r>
               <a:rPr lang="en-IL" dirty="0"/>
-              <a:t>iRegulon  (= </a:t>
-            </a:r>
-            <a:r>
-              <a:rPr lang="en-US" dirty="0" err="1"/>
-              <a:t>cisTarget</a:t>
-            </a:r>
-            <a:r>
-              <a:rPr lang="en-US" dirty="0"/>
-              <a:t>) </a:t>
-            </a:r>
-          </a:p>
-          <a:p>
-            <a:endParaRPr lang="en-US" dirty="0"/>
+              <a:t>Genome rankings are pre-computed for all motifs in our collection that are linked to a known TF.</a:t>
+            </a:r>
+          </a:p>
+          <a:p>
+            <a:endParaRPr lang="en-IL" dirty="0"/>
           </a:p>
           <a:p>
             <a:r>
@@ -3362,7 +3361,7 @@
             </a:r>
             <a:r>
               <a:rPr lang="en-US" dirty="0" err="1"/>
-              <a:t>journals.plos.org</a:t>
+              <a:t>www.ncbi.nlm.nih.gov</a:t>
             </a:r>
             <a:r>
               <a:rPr lang="en-US" dirty="0"/>
@@ -3370,23 +3369,19 @@
             </a:r>
             <a:r>
               <a:rPr lang="en-US" dirty="0" err="1"/>
-              <a:t>ploscompbiol</a:t>
+              <a:t>pmc</a:t>
             </a:r>
             <a:r>
               <a:rPr lang="en-US" dirty="0"/>
-              <a:t>/</a:t>
-            </a:r>
-            <a:r>
-              <a:rPr lang="en-US" dirty="0" err="1"/>
-              <a:t>article?id</a:t>
-            </a:r>
-            <a:r>
-              <a:rPr lang="en-US" dirty="0"/>
-              <a:t>=10.1371/journal.pcbi.1003731</a:t>
-            </a:r>
-          </a:p>
-          <a:p>
+              <a:t>/articles/PMC2910651/</a:t>
+            </a:r>
             <a:endParaRPr lang="en-IL" dirty="0"/>
+          </a:p>
+          <a:p>
+            <a:r>
+              <a:rPr lang="en-IL" dirty="0"/>
+              <a:t> </a:t>
+            </a:r>
           </a:p>
         </p:txBody>
       </p:sp>
@@ -3407,7 +3402,7 @@
           <a:p>
             <a:fld id="{86AFD4FA-721D-0140-967B-1B04101EA7BE}" type="slidenum">
               <a:rPr lang="en-IL" smtClean="0"/>
-              <a:t>19</a:t>
+              <a:t>17</a:t>
             </a:fld>
             <a:endParaRPr lang="en-IL"/>
           </a:p>
@@ -3416,7 +3411,7 @@
     </p:spTree>
     <p:extLst>
       <p:ext uri="{BB962C8B-B14F-4D97-AF65-F5344CB8AC3E}">
-        <p14:creationId xmlns:p14="http://schemas.microsoft.com/office/powerpoint/2010/main" val="3588214473"/>
+        <p14:creationId xmlns:p14="http://schemas.microsoft.com/office/powerpoint/2010/main" val="802723121"/>
       </p:ext>
     </p:extLst>
   </p:cSld>
@@ -3470,6 +3465,315 @@
           <a:bodyPr/>
           <a:lstStyle/>
           <a:p>
+            <a:r>
+              <a:rPr lang="en-IL" dirty="0"/>
+              <a:t>Leading edge: </a:t>
+            </a:r>
+          </a:p>
+        </p:txBody>
+      </p:sp>
+      <p:sp>
+        <p:nvSpPr>
+          <p:cNvPr id="4" name="Slide Number Placeholder 3"/>
+          <p:cNvSpPr>
+            <a:spLocks noGrp="1"/>
+          </p:cNvSpPr>
+          <p:nvPr>
+            <p:ph type="sldNum" sz="quarter" idx="5"/>
+          </p:nvPr>
+        </p:nvSpPr>
+        <p:spPr/>
+        <p:txBody>
+          <a:bodyPr/>
+          <a:lstStyle/>
+          <a:p>
+            <a:fld id="{86AFD4FA-721D-0140-967B-1B04101EA7BE}" type="slidenum">
+              <a:rPr lang="en-IL" smtClean="0"/>
+              <a:t>18</a:t>
+            </a:fld>
+            <a:endParaRPr lang="en-IL"/>
+          </a:p>
+        </p:txBody>
+      </p:sp>
+    </p:spTree>
+    <p:extLst>
+      <p:ext uri="{BB962C8B-B14F-4D97-AF65-F5344CB8AC3E}">
+        <p14:creationId xmlns:p14="http://schemas.microsoft.com/office/powerpoint/2010/main" val="2811168132"/>
+      </p:ext>
+    </p:extLst>
+  </p:cSld>
+  <p:clrMapOvr>
+    <a:masterClrMapping/>
+  </p:clrMapOvr>
+</p:notes>
+</file>
+
+<file path=ppt/notesSlides/notesSlide14.xml><?xml version="1.0" encoding="utf-8"?>
+<p:notes xmlns:a="http://schemas.openxmlformats.org/drawingml/2006/main" xmlns:r="http://schemas.openxmlformats.org/officeDocument/2006/relationships" xmlns:p="http://schemas.openxmlformats.org/presentationml/2006/main">
+  <p:cSld>
+    <p:spTree>
+      <p:nvGrpSpPr>
+        <p:cNvPr id="1" name=""/>
+        <p:cNvGrpSpPr/>
+        <p:nvPr/>
+      </p:nvGrpSpPr>
+      <p:grpSpPr>
+        <a:xfrm>
+          <a:off x="0" y="0"/>
+          <a:ext cx="0" cy="0"/>
+          <a:chOff x="0" y="0"/>
+          <a:chExt cx="0" cy="0"/>
+        </a:xfrm>
+      </p:grpSpPr>
+      <p:sp>
+        <p:nvSpPr>
+          <p:cNvPr id="2" name="Slide Image Placeholder 1"/>
+          <p:cNvSpPr>
+            <a:spLocks noGrp="1" noRot="1" noChangeAspect="1"/>
+          </p:cNvSpPr>
+          <p:nvPr>
+            <p:ph type="sldImg"/>
+          </p:nvPr>
+        </p:nvSpPr>
+        <p:spPr/>
+      </p:sp>
+      <p:sp>
+        <p:nvSpPr>
+          <p:cNvPr id="3" name="Notes Placeholder 2"/>
+          <p:cNvSpPr>
+            <a:spLocks noGrp="1"/>
+          </p:cNvSpPr>
+          <p:nvPr>
+            <p:ph type="body" idx="1"/>
+          </p:nvPr>
+        </p:nvSpPr>
+        <p:spPr/>
+        <p:txBody>
+          <a:bodyPr/>
+          <a:lstStyle/>
+          <a:p>
+            <a:r>
+              <a:rPr lang="en-IL" dirty="0"/>
+              <a:t>iRegulon  (= </a:t>
+            </a:r>
+            <a:r>
+              <a:rPr lang="en-US" dirty="0" err="1"/>
+              <a:t>cisTarget</a:t>
+            </a:r>
+            <a:r>
+              <a:rPr lang="en-US" dirty="0"/>
+              <a:t>) </a:t>
+            </a:r>
+          </a:p>
+          <a:p>
+            <a:endParaRPr lang="en-US" dirty="0"/>
+          </a:p>
+          <a:p>
+            <a:r>
+              <a:rPr lang="en-US" dirty="0"/>
+              <a:t>https://</a:t>
+            </a:r>
+            <a:r>
+              <a:rPr lang="en-US" dirty="0" err="1"/>
+              <a:t>journals.plos.org</a:t>
+            </a:r>
+            <a:r>
+              <a:rPr lang="en-US" dirty="0"/>
+              <a:t>/</a:t>
+            </a:r>
+            <a:r>
+              <a:rPr lang="en-US" dirty="0" err="1"/>
+              <a:t>ploscompbiol</a:t>
+            </a:r>
+            <a:r>
+              <a:rPr lang="en-US" dirty="0"/>
+              <a:t>/</a:t>
+            </a:r>
+            <a:r>
+              <a:rPr lang="en-US" dirty="0" err="1"/>
+              <a:t>article?id</a:t>
+            </a:r>
+            <a:r>
+              <a:rPr lang="en-US" dirty="0"/>
+              <a:t>=10.1371/journal.pcbi.1003731</a:t>
+            </a:r>
+          </a:p>
+          <a:p>
+            <a:endParaRPr lang="en-US" dirty="0"/>
+          </a:p>
+          <a:p>
+            <a:pPr algn="l">
+              <a:lnSpc>
+                <a:spcPts val="2250"/>
+              </a:lnSpc>
+              <a:spcBef>
+                <a:spcPts val="2000"/>
+              </a:spcBef>
+              <a:spcAft>
+                <a:spcPts val="1000"/>
+              </a:spcAft>
+            </a:pPr>
+            <a:r>
+              <a:rPr lang="en-US" sz="1800" b="0" i="0" u="none" strike="noStrike" dirty="0">
+                <a:solidFill>
+                  <a:srgbClr val="734126"/>
+                </a:solidFill>
+                <a:effectLst/>
+                <a:latin typeface="Cambria" panose="02040503050406030204" pitchFamily="18" charset="0"/>
+              </a:rPr>
+              <a:t>Detection of the target genes</a:t>
+            </a:r>
+          </a:p>
+          <a:p>
+            <a:pPr algn="l">
+              <a:spcBef>
+                <a:spcPts val="2000"/>
+              </a:spcBef>
+              <a:spcAft>
+                <a:spcPts val="2000"/>
+              </a:spcAft>
+            </a:pPr>
+            <a:r>
+              <a:rPr lang="en-US" b="0" i="0" u="none" strike="noStrike" dirty="0">
+                <a:solidFill>
+                  <a:srgbClr val="212121"/>
+                </a:solidFill>
+                <a:effectLst/>
+                <a:latin typeface="Cambria" panose="02040503050406030204" pitchFamily="18" charset="0"/>
+              </a:rPr>
+              <a:t>For each enriched motif, the candidate targets are selected as the optimal subset of highly ranked genes compared to the genomic background and to the entire motif collection as background. This step is illustrated in </a:t>
+            </a:r>
+            <a:r>
+              <a:rPr lang="en-US" b="0" i="0" u="sng" strike="noStrike" dirty="0">
+                <a:solidFill>
+                  <a:srgbClr val="4C2C92"/>
+                </a:solidFill>
+                <a:effectLst/>
+                <a:latin typeface="Cambria" panose="02040503050406030204" pitchFamily="18" charset="0"/>
+                <a:hlinkClick r:id="rId3"/>
+              </a:rPr>
+              <a:t>Fig. 1B</a:t>
+            </a:r>
+            <a:r>
+              <a:rPr lang="en-US" b="0" i="0" u="none" strike="noStrike" dirty="0">
+                <a:solidFill>
+                  <a:srgbClr val="212121"/>
+                </a:solidFill>
+                <a:effectLst/>
+                <a:latin typeface="Cambria" panose="02040503050406030204" pitchFamily="18" charset="0"/>
+              </a:rPr>
+              <a:t>. The target gene recovery is plotted along the whole-genome ranking for a given motif (blue curve) and compared to the average recovery + (2× standard deviation) (red curve) for all motifs in the collection. Similarly to the GSEA approach </a:t>
+            </a:r>
+            <a:r>
+              <a:rPr lang="en-US" b="0" i="0" u="sng" strike="noStrike" dirty="0">
+                <a:solidFill>
+                  <a:srgbClr val="4C2C92"/>
+                </a:solidFill>
+                <a:effectLst/>
+                <a:latin typeface="Cambria" panose="02040503050406030204" pitchFamily="18" charset="0"/>
+                <a:hlinkClick r:id="rId4"/>
+              </a:rPr>
+              <a:t>[71]</a:t>
+            </a:r>
+            <a:r>
+              <a:rPr lang="en-US" b="0" i="0" u="none" strike="noStrike" dirty="0">
+                <a:solidFill>
+                  <a:srgbClr val="212121"/>
+                </a:solidFill>
+                <a:effectLst/>
+                <a:latin typeface="Cambria" panose="02040503050406030204" pitchFamily="18" charset="0"/>
+              </a:rPr>
+              <a:t>, the leading edge corresponds to the rank where the difference between the signal (blue curve) and the background (red curve) is maximal within the top ranked genes (the latter is defined by the Rank Threshold parameter). The input genes that have a better ranking than the rank at the leading edge are predicted as target genes for the given motif or track.</a:t>
+            </a:r>
+          </a:p>
+          <a:p>
+            <a:endParaRPr lang="en-US" dirty="0"/>
+          </a:p>
+          <a:p>
+            <a:endParaRPr lang="en-IL" dirty="0"/>
+          </a:p>
+        </p:txBody>
+      </p:sp>
+      <p:sp>
+        <p:nvSpPr>
+          <p:cNvPr id="4" name="Slide Number Placeholder 3"/>
+          <p:cNvSpPr>
+            <a:spLocks noGrp="1"/>
+          </p:cNvSpPr>
+          <p:nvPr>
+            <p:ph type="sldNum" sz="quarter" idx="5"/>
+          </p:nvPr>
+        </p:nvSpPr>
+        <p:spPr/>
+        <p:txBody>
+          <a:bodyPr/>
+          <a:lstStyle/>
+          <a:p>
+            <a:fld id="{86AFD4FA-721D-0140-967B-1B04101EA7BE}" type="slidenum">
+              <a:rPr lang="en-IL" smtClean="0"/>
+              <a:t>19</a:t>
+            </a:fld>
+            <a:endParaRPr lang="en-IL"/>
+          </a:p>
+        </p:txBody>
+      </p:sp>
+    </p:spTree>
+    <p:extLst>
+      <p:ext uri="{BB962C8B-B14F-4D97-AF65-F5344CB8AC3E}">
+        <p14:creationId xmlns:p14="http://schemas.microsoft.com/office/powerpoint/2010/main" val="3588214473"/>
+      </p:ext>
+    </p:extLst>
+  </p:cSld>
+  <p:clrMapOvr>
+    <a:masterClrMapping/>
+  </p:clrMapOvr>
+</p:notes>
+</file>
+
+<file path=ppt/notesSlides/notesSlide15.xml><?xml version="1.0" encoding="utf-8"?>
+<p:notes xmlns:a="http://schemas.openxmlformats.org/drawingml/2006/main" xmlns:r="http://schemas.openxmlformats.org/officeDocument/2006/relationships" xmlns:p="http://schemas.openxmlformats.org/presentationml/2006/main">
+  <p:cSld>
+    <p:spTree>
+      <p:nvGrpSpPr>
+        <p:cNvPr id="1" name=""/>
+        <p:cNvGrpSpPr/>
+        <p:nvPr/>
+      </p:nvGrpSpPr>
+      <p:grpSpPr>
+        <a:xfrm>
+          <a:off x="0" y="0"/>
+          <a:ext cx="0" cy="0"/>
+          <a:chOff x="0" y="0"/>
+          <a:chExt cx="0" cy="0"/>
+        </a:xfrm>
+      </p:grpSpPr>
+      <p:sp>
+        <p:nvSpPr>
+          <p:cNvPr id="2" name="Slide Image Placeholder 1"/>
+          <p:cNvSpPr>
+            <a:spLocks noGrp="1" noRot="1" noChangeAspect="1"/>
+          </p:cNvSpPr>
+          <p:nvPr>
+            <p:ph type="sldImg"/>
+          </p:nvPr>
+        </p:nvSpPr>
+        <p:spPr/>
+      </p:sp>
+      <p:sp>
+        <p:nvSpPr>
+          <p:cNvPr id="3" name="Notes Placeholder 2"/>
+          <p:cNvSpPr>
+            <a:spLocks noGrp="1"/>
+          </p:cNvSpPr>
+          <p:nvPr>
+            <p:ph type="body" idx="1"/>
+          </p:nvPr>
+        </p:nvSpPr>
+        <p:spPr/>
+        <p:txBody>
+          <a:bodyPr/>
+          <a:lstStyle/>
+          <a:p>
             <a:pPr marL="0" algn="l" defTabSz="914400" rtl="0" eaLnBrk="1" latinLnBrk="0" hangingPunct="1"/>
             <a:r>
               <a:rPr lang="en-IL" dirty="0"/>
@@ -3516,6 +3820,470 @@
     <p:extLst>
       <p:ext uri="{BB962C8B-B14F-4D97-AF65-F5344CB8AC3E}">
         <p14:creationId xmlns:p14="http://schemas.microsoft.com/office/powerpoint/2010/main" val="3669540211"/>
+      </p:ext>
+    </p:extLst>
+  </p:cSld>
+  <p:clrMapOvr>
+    <a:masterClrMapping/>
+  </p:clrMapOvr>
+</p:notes>
+</file>
+
+<file path=ppt/notesSlides/notesSlide16.xml><?xml version="1.0" encoding="utf-8"?>
+<p:notes xmlns:a="http://schemas.openxmlformats.org/drawingml/2006/main" xmlns:r="http://schemas.openxmlformats.org/officeDocument/2006/relationships" xmlns:p="http://schemas.openxmlformats.org/presentationml/2006/main">
+  <p:cSld>
+    <p:spTree>
+      <p:nvGrpSpPr>
+        <p:cNvPr id="1" name=""/>
+        <p:cNvGrpSpPr/>
+        <p:nvPr/>
+      </p:nvGrpSpPr>
+      <p:grpSpPr>
+        <a:xfrm>
+          <a:off x="0" y="0"/>
+          <a:ext cx="0" cy="0"/>
+          <a:chOff x="0" y="0"/>
+          <a:chExt cx="0" cy="0"/>
+        </a:xfrm>
+      </p:grpSpPr>
+      <p:sp>
+        <p:nvSpPr>
+          <p:cNvPr id="2" name="Slide Image Placeholder 1"/>
+          <p:cNvSpPr>
+            <a:spLocks noGrp="1" noRot="1" noChangeAspect="1"/>
+          </p:cNvSpPr>
+          <p:nvPr>
+            <p:ph type="sldImg"/>
+          </p:nvPr>
+        </p:nvSpPr>
+        <p:spPr/>
+      </p:sp>
+      <p:sp>
+        <p:nvSpPr>
+          <p:cNvPr id="3" name="Notes Placeholder 2"/>
+          <p:cNvSpPr>
+            <a:spLocks noGrp="1"/>
+          </p:cNvSpPr>
+          <p:nvPr>
+            <p:ph type="body" idx="1"/>
+          </p:nvPr>
+        </p:nvSpPr>
+        <p:spPr/>
+        <p:txBody>
+          <a:bodyPr/>
+          <a:lstStyle/>
+          <a:p>
+            <a:r>
+              <a:rPr lang="en-US" dirty="0"/>
+              <a:t>https://</a:t>
+            </a:r>
+            <a:r>
+              <a:rPr lang="en-US" dirty="0" err="1"/>
+              <a:t>www.nature.com</a:t>
+            </a:r>
+            <a:r>
+              <a:rPr lang="en-US" dirty="0"/>
+              <a:t>/articles/s41596-020-0336-2</a:t>
+            </a:r>
+            <a:endParaRPr lang="en-IL" dirty="0"/>
+          </a:p>
+        </p:txBody>
+      </p:sp>
+      <p:sp>
+        <p:nvSpPr>
+          <p:cNvPr id="4" name="Slide Number Placeholder 3"/>
+          <p:cNvSpPr>
+            <a:spLocks noGrp="1"/>
+          </p:cNvSpPr>
+          <p:nvPr>
+            <p:ph type="sldNum" sz="quarter" idx="5"/>
+          </p:nvPr>
+        </p:nvSpPr>
+        <p:spPr/>
+        <p:txBody>
+          <a:bodyPr/>
+          <a:lstStyle/>
+          <a:p>
+            <a:fld id="{86AFD4FA-721D-0140-967B-1B04101EA7BE}" type="slidenum">
+              <a:rPr lang="en-IL" smtClean="0"/>
+              <a:t>25</a:t>
+            </a:fld>
+            <a:endParaRPr lang="en-IL"/>
+          </a:p>
+        </p:txBody>
+      </p:sp>
+    </p:spTree>
+    <p:extLst>
+      <p:ext uri="{BB962C8B-B14F-4D97-AF65-F5344CB8AC3E}">
+        <p14:creationId xmlns:p14="http://schemas.microsoft.com/office/powerpoint/2010/main" val="2273289122"/>
+      </p:ext>
+    </p:extLst>
+  </p:cSld>
+  <p:clrMapOvr>
+    <a:masterClrMapping/>
+  </p:clrMapOvr>
+</p:notes>
+</file>
+
+<file path=ppt/notesSlides/notesSlide17.xml><?xml version="1.0" encoding="utf-8"?>
+<p:notes xmlns:a="http://schemas.openxmlformats.org/drawingml/2006/main" xmlns:r="http://schemas.openxmlformats.org/officeDocument/2006/relationships" xmlns:p="http://schemas.openxmlformats.org/presentationml/2006/main">
+  <p:cSld>
+    <p:spTree>
+      <p:nvGrpSpPr>
+        <p:cNvPr id="1" name=""/>
+        <p:cNvGrpSpPr/>
+        <p:nvPr/>
+      </p:nvGrpSpPr>
+      <p:grpSpPr>
+        <a:xfrm>
+          <a:off x="0" y="0"/>
+          <a:ext cx="0" cy="0"/>
+          <a:chOff x="0" y="0"/>
+          <a:chExt cx="0" cy="0"/>
+        </a:xfrm>
+      </p:grpSpPr>
+      <p:sp>
+        <p:nvSpPr>
+          <p:cNvPr id="2" name="Slide Image Placeholder 1"/>
+          <p:cNvSpPr>
+            <a:spLocks noGrp="1" noRot="1" noChangeAspect="1"/>
+          </p:cNvSpPr>
+          <p:nvPr>
+            <p:ph type="sldImg"/>
+          </p:nvPr>
+        </p:nvSpPr>
+        <p:spPr/>
+      </p:sp>
+      <p:sp>
+        <p:nvSpPr>
+          <p:cNvPr id="3" name="Notes Placeholder 2"/>
+          <p:cNvSpPr>
+            <a:spLocks noGrp="1"/>
+          </p:cNvSpPr>
+          <p:nvPr>
+            <p:ph type="body" idx="1"/>
+          </p:nvPr>
+        </p:nvSpPr>
+        <p:spPr/>
+        <p:txBody>
+          <a:bodyPr/>
+          <a:lstStyle/>
+          <a:p>
+            <a:pPr marL="0" algn="l" defTabSz="914400" rtl="0" eaLnBrk="1" latinLnBrk="0" hangingPunct="1"/>
+            <a:r>
+              <a:rPr lang="en-IL" dirty="0"/>
+              <a:t>(+) / (-) : activator / suppressor </a:t>
+            </a:r>
+          </a:p>
+          <a:p>
+            <a:pPr marL="0" algn="l" defTabSz="914400" rtl="0" eaLnBrk="1" latinLnBrk="0" hangingPunct="1"/>
+            <a:r>
+              <a:rPr lang="en-US" dirty="0"/>
+              <a:t>V</a:t>
+            </a:r>
+            <a:r>
+              <a:rPr lang="en-IL" dirty="0"/>
+              <a:t>alue: </a:t>
+            </a:r>
+          </a:p>
+        </p:txBody>
+      </p:sp>
+      <p:sp>
+        <p:nvSpPr>
+          <p:cNvPr id="4" name="Slide Number Placeholder 3"/>
+          <p:cNvSpPr>
+            <a:spLocks noGrp="1"/>
+          </p:cNvSpPr>
+          <p:nvPr>
+            <p:ph type="sldNum" sz="quarter" idx="5"/>
+          </p:nvPr>
+        </p:nvSpPr>
+        <p:spPr/>
+        <p:txBody>
+          <a:bodyPr/>
+          <a:lstStyle/>
+          <a:p>
+            <a:fld id="{86AFD4FA-721D-0140-967B-1B04101EA7BE}" type="slidenum">
+              <a:rPr lang="en-IL" smtClean="0"/>
+              <a:t>28</a:t>
+            </a:fld>
+            <a:endParaRPr lang="en-IL"/>
+          </a:p>
+        </p:txBody>
+      </p:sp>
+    </p:spTree>
+    <p:extLst>
+      <p:ext uri="{BB962C8B-B14F-4D97-AF65-F5344CB8AC3E}">
+        <p14:creationId xmlns:p14="http://schemas.microsoft.com/office/powerpoint/2010/main" val="915191090"/>
+      </p:ext>
+    </p:extLst>
+  </p:cSld>
+  <p:clrMapOvr>
+    <a:masterClrMapping/>
+  </p:clrMapOvr>
+</p:notes>
+</file>
+
+<file path=ppt/notesSlides/notesSlide18.xml><?xml version="1.0" encoding="utf-8"?>
+<p:notes xmlns:a="http://schemas.openxmlformats.org/drawingml/2006/main" xmlns:r="http://schemas.openxmlformats.org/officeDocument/2006/relationships" xmlns:p="http://schemas.openxmlformats.org/presentationml/2006/main">
+  <p:cSld>
+    <p:spTree>
+      <p:nvGrpSpPr>
+        <p:cNvPr id="1" name=""/>
+        <p:cNvGrpSpPr/>
+        <p:nvPr/>
+      </p:nvGrpSpPr>
+      <p:grpSpPr>
+        <a:xfrm>
+          <a:off x="0" y="0"/>
+          <a:ext cx="0" cy="0"/>
+          <a:chOff x="0" y="0"/>
+          <a:chExt cx="0" cy="0"/>
+        </a:xfrm>
+      </p:grpSpPr>
+      <p:sp>
+        <p:nvSpPr>
+          <p:cNvPr id="2" name="Slide Image Placeholder 1"/>
+          <p:cNvSpPr>
+            <a:spLocks noGrp="1" noRot="1" noChangeAspect="1"/>
+          </p:cNvSpPr>
+          <p:nvPr>
+            <p:ph type="sldImg"/>
+          </p:nvPr>
+        </p:nvSpPr>
+        <p:spPr/>
+      </p:sp>
+      <p:sp>
+        <p:nvSpPr>
+          <p:cNvPr id="3" name="Notes Placeholder 2"/>
+          <p:cNvSpPr>
+            <a:spLocks noGrp="1"/>
+          </p:cNvSpPr>
+          <p:nvPr>
+            <p:ph type="body" idx="1"/>
+          </p:nvPr>
+        </p:nvSpPr>
+        <p:spPr/>
+        <p:txBody>
+          <a:bodyPr/>
+          <a:lstStyle/>
+          <a:p>
+            <a:r>
+              <a:rPr lang="en-US" dirty="0"/>
+              <a:t>https://</a:t>
+            </a:r>
+            <a:r>
+              <a:rPr lang="en-US" dirty="0" err="1"/>
+              <a:t>pyscenic.readthedocs.io</a:t>
+            </a:r>
+            <a:r>
+              <a:rPr lang="en-US" dirty="0"/>
+              <a:t>/</a:t>
+            </a:r>
+            <a:r>
+              <a:rPr lang="en-US" dirty="0" err="1"/>
+              <a:t>en</a:t>
+            </a:r>
+            <a:r>
+              <a:rPr lang="en-US" dirty="0"/>
+              <a:t>/stable/</a:t>
+            </a:r>
+            <a:r>
+              <a:rPr lang="en-US" dirty="0" err="1"/>
+              <a:t>faq.html</a:t>
+            </a:r>
+            <a:endParaRPr lang="en-US" dirty="0"/>
+          </a:p>
+          <a:p>
+            <a:endParaRPr lang="en-US" dirty="0"/>
+          </a:p>
+          <a:p>
+            <a:endParaRPr lang="en-IL" dirty="0"/>
+          </a:p>
+        </p:txBody>
+      </p:sp>
+      <p:sp>
+        <p:nvSpPr>
+          <p:cNvPr id="4" name="Slide Number Placeholder 3"/>
+          <p:cNvSpPr>
+            <a:spLocks noGrp="1"/>
+          </p:cNvSpPr>
+          <p:nvPr>
+            <p:ph type="sldNum" sz="quarter" idx="5"/>
+          </p:nvPr>
+        </p:nvSpPr>
+        <p:spPr/>
+        <p:txBody>
+          <a:bodyPr/>
+          <a:lstStyle/>
+          <a:p>
+            <a:fld id="{86AFD4FA-721D-0140-967B-1B04101EA7BE}" type="slidenum">
+              <a:rPr lang="en-IL" smtClean="0"/>
+              <a:t>29</a:t>
+            </a:fld>
+            <a:endParaRPr lang="en-IL"/>
+          </a:p>
+        </p:txBody>
+      </p:sp>
+    </p:spTree>
+    <p:extLst>
+      <p:ext uri="{BB962C8B-B14F-4D97-AF65-F5344CB8AC3E}">
+        <p14:creationId xmlns:p14="http://schemas.microsoft.com/office/powerpoint/2010/main" val="156342503"/>
+      </p:ext>
+    </p:extLst>
+  </p:cSld>
+  <p:clrMapOvr>
+    <a:masterClrMapping/>
+  </p:clrMapOvr>
+</p:notes>
+</file>
+
+<file path=ppt/notesSlides/notesSlide19.xml><?xml version="1.0" encoding="utf-8"?>
+<p:notes xmlns:a="http://schemas.openxmlformats.org/drawingml/2006/main" xmlns:r="http://schemas.openxmlformats.org/officeDocument/2006/relationships" xmlns:p="http://schemas.openxmlformats.org/presentationml/2006/main">
+  <p:cSld>
+    <p:spTree>
+      <p:nvGrpSpPr>
+        <p:cNvPr id="1" name=""/>
+        <p:cNvGrpSpPr/>
+        <p:nvPr/>
+      </p:nvGrpSpPr>
+      <p:grpSpPr>
+        <a:xfrm>
+          <a:off x="0" y="0"/>
+          <a:ext cx="0" cy="0"/>
+          <a:chOff x="0" y="0"/>
+          <a:chExt cx="0" cy="0"/>
+        </a:xfrm>
+      </p:grpSpPr>
+      <p:sp>
+        <p:nvSpPr>
+          <p:cNvPr id="2" name="Slide Image Placeholder 1"/>
+          <p:cNvSpPr>
+            <a:spLocks noGrp="1" noRot="1" noChangeAspect="1"/>
+          </p:cNvSpPr>
+          <p:nvPr>
+            <p:ph type="sldImg"/>
+          </p:nvPr>
+        </p:nvSpPr>
+        <p:spPr/>
+      </p:sp>
+      <p:sp>
+        <p:nvSpPr>
+          <p:cNvPr id="3" name="Notes Placeholder 2"/>
+          <p:cNvSpPr>
+            <a:spLocks noGrp="1"/>
+          </p:cNvSpPr>
+          <p:nvPr>
+            <p:ph type="body" idx="1"/>
+          </p:nvPr>
+        </p:nvSpPr>
+        <p:spPr/>
+        <p:txBody>
+          <a:bodyPr/>
+          <a:lstStyle/>
+          <a:p>
+            <a:pPr marL="0" algn="l" defTabSz="914400" rtl="1" eaLnBrk="1" latinLnBrk="0" hangingPunct="1"/>
+            <a:r>
+              <a:rPr lang="en-US" dirty="0"/>
+              <a:t>Jensen-Shannon divergence: </a:t>
+            </a:r>
+            <a:r>
+              <a:rPr lang="en-US" b="0" i="0" u="none" strike="noStrike" dirty="0">
+                <a:solidFill>
+                  <a:srgbClr val="202122"/>
+                </a:solidFill>
+                <a:effectLst/>
+                <a:latin typeface="Arial" panose="020B0604020202020204" pitchFamily="34" charset="0"/>
+              </a:rPr>
+              <a:t>method of measuring the similarity between two probability distributions.</a:t>
+            </a:r>
+          </a:p>
+          <a:p>
+            <a:pPr marL="0" algn="l" defTabSz="914400" rtl="1" eaLnBrk="1" latinLnBrk="0" hangingPunct="1"/>
+            <a:endParaRPr lang="en-US" b="0" i="0" u="none" strike="noStrike" dirty="0">
+              <a:solidFill>
+                <a:srgbClr val="202122"/>
+              </a:solidFill>
+              <a:effectLst/>
+              <a:latin typeface="Arial" panose="020B0604020202020204" pitchFamily="34" charset="0"/>
+            </a:endParaRPr>
+          </a:p>
+          <a:p>
+            <a:pPr marL="0" algn="l" defTabSz="914400" rtl="1" eaLnBrk="1" latinLnBrk="0" hangingPunct="1"/>
+            <a:r>
+              <a:rPr lang="en-US" b="0" i="0" u="none" strike="noStrike" dirty="0">
+                <a:solidFill>
+                  <a:srgbClr val="202122"/>
+                </a:solidFill>
+                <a:effectLst/>
+                <a:latin typeface="Arial" panose="020B0604020202020204" pitchFamily="34" charset="0"/>
+              </a:rPr>
+              <a:t>https://</a:t>
+            </a:r>
+            <a:r>
+              <a:rPr lang="en-US" b="0" i="0" u="none" strike="noStrike" dirty="0" err="1">
+                <a:solidFill>
+                  <a:srgbClr val="202122"/>
+                </a:solidFill>
+                <a:effectLst/>
+                <a:latin typeface="Arial" panose="020B0604020202020204" pitchFamily="34" charset="0"/>
+              </a:rPr>
+              <a:t>www.nature.com</a:t>
+            </a:r>
+            <a:r>
+              <a:rPr lang="en-US" b="0" i="0" u="none" strike="noStrike" dirty="0">
+                <a:solidFill>
+                  <a:srgbClr val="202122"/>
+                </a:solidFill>
+                <a:effectLst/>
+                <a:latin typeface="Arial" panose="020B0604020202020204" pitchFamily="34" charset="0"/>
+              </a:rPr>
+              <a:t>/articles/s41596-020-0336-2</a:t>
+            </a:r>
+          </a:p>
+          <a:p>
+            <a:pPr marL="0" algn="l" defTabSz="914400" rtl="1" eaLnBrk="1" latinLnBrk="0" hangingPunct="1"/>
+            <a:r>
+              <a:rPr lang="en-US" b="0" i="0" u="none" strike="noStrike" dirty="0">
+                <a:solidFill>
+                  <a:srgbClr val="202122"/>
+                </a:solidFill>
+                <a:effectLst/>
+                <a:latin typeface="Arial" panose="020B0604020202020204" pitchFamily="34" charset="0"/>
+              </a:rPr>
+              <a:t> </a:t>
+            </a:r>
+            <a:endParaRPr lang="en-IL" dirty="0"/>
+          </a:p>
+        </p:txBody>
+      </p:sp>
+      <p:sp>
+        <p:nvSpPr>
+          <p:cNvPr id="4" name="Slide Number Placeholder 3"/>
+          <p:cNvSpPr>
+            <a:spLocks noGrp="1"/>
+          </p:cNvSpPr>
+          <p:nvPr>
+            <p:ph type="sldNum" sz="quarter" idx="5"/>
+          </p:nvPr>
+        </p:nvSpPr>
+        <p:spPr/>
+        <p:txBody>
+          <a:bodyPr/>
+          <a:lstStyle/>
+          <a:p>
+            <a:fld id="{86AFD4FA-721D-0140-967B-1B04101EA7BE}" type="slidenum">
+              <a:rPr lang="en-IL" smtClean="0"/>
+              <a:t>32</a:t>
+            </a:fld>
+            <a:endParaRPr lang="en-IL"/>
+          </a:p>
+        </p:txBody>
+      </p:sp>
+    </p:spTree>
+    <p:extLst>
+      <p:ext uri="{BB962C8B-B14F-4D97-AF65-F5344CB8AC3E}">
+        <p14:creationId xmlns:p14="http://schemas.microsoft.com/office/powerpoint/2010/main" val="3234677798"/>
       </p:ext>
     </p:extLst>
   </p:cSld>
@@ -4120,6 +4888,18 @@
           <a:p>
             <a:endParaRPr lang="en-IL" dirty="0"/>
           </a:p>
+          <a:p>
+            <a:r>
+              <a:rPr lang="en-IL" dirty="0"/>
+              <a:t>GENIE3 -&gt; Bagging</a:t>
+            </a:r>
+          </a:p>
+          <a:p>
+            <a:r>
+              <a:rPr lang="en-IL" dirty="0"/>
+              <a:t>GRNBoost2 -&gt; Boosting</a:t>
+            </a:r>
+          </a:p>
         </p:txBody>
       </p:sp>
       <p:sp>
@@ -4411,6 +5191,7 @@
           <a:bodyPr/>
           <a:lstStyle/>
           <a:p>
+            <a:pPr marL="0" algn="r" defTabSz="914400" rtl="1" eaLnBrk="1" latinLnBrk="0" hangingPunct="1"/>
             <a:endParaRPr lang="en-IL" dirty="0"/>
           </a:p>
         </p:txBody>
@@ -4519,10 +5300,90 @@
             <a:endParaRPr lang="en-IL" dirty="0"/>
           </a:p>
           <a:p>
-            <a:r>
-              <a:rPr lang="en-IL" dirty="0"/>
-              <a:t>*How many target genes per one TF in Drosophila? </a:t>
-            </a:r>
+            <a:pPr marL="171450" indent="-171450">
+              <a:buFont typeface="Arial" panose="020B0604020202020204" pitchFamily="34" charset="0"/>
+              <a:buChar char="•"/>
+            </a:pPr>
+            <a:r>
+              <a:rPr lang="en-US" b="0" i="0" u="none" strike="noStrike" dirty="0">
+                <a:solidFill>
+                  <a:srgbClr val="222222"/>
+                </a:solidFill>
+                <a:effectLst/>
+                <a:latin typeface="Harding"/>
+              </a:rPr>
+              <a:t>By default, only positively correlated modules are used in the subsequent steps because these negatively correlated modules are less numerous, their regulatory interaction weights are lower and the resulting regulons show overall less motif enrichment. (https://</a:t>
+            </a:r>
+            <a:r>
+              <a:rPr lang="en-US" b="0" i="0" u="none" strike="noStrike" dirty="0" err="1">
+                <a:solidFill>
+                  <a:srgbClr val="222222"/>
+                </a:solidFill>
+                <a:effectLst/>
+                <a:latin typeface="Harding"/>
+              </a:rPr>
+              <a:t>www.nature.com</a:t>
+            </a:r>
+            <a:r>
+              <a:rPr lang="en-US" b="0" i="0" u="none" strike="noStrike" dirty="0">
+                <a:solidFill>
+                  <a:srgbClr val="222222"/>
+                </a:solidFill>
+                <a:effectLst/>
+                <a:latin typeface="Harding"/>
+              </a:rPr>
+              <a:t>/articles/s41596-020-0336-2, module generation, step 6)</a:t>
+            </a:r>
+          </a:p>
+          <a:p>
+            <a:pPr marL="171450" indent="-171450">
+              <a:buFont typeface="Arial" panose="020B0604020202020204" pitchFamily="34" charset="0"/>
+              <a:buChar char="•"/>
+            </a:pPr>
+            <a:endParaRPr lang="en-US" b="0" i="0" u="none" strike="noStrike" dirty="0">
+              <a:solidFill>
+                <a:srgbClr val="222222"/>
+              </a:solidFill>
+              <a:effectLst/>
+              <a:latin typeface="Harding"/>
+            </a:endParaRPr>
+          </a:p>
+          <a:p>
+            <a:pPr marL="171450" indent="-171450">
+              <a:buFont typeface="Arial" panose="020B0604020202020204" pitchFamily="34" charset="0"/>
+              <a:buChar char="•"/>
+            </a:pPr>
+            <a:r>
+              <a:rPr lang="en-US" b="0" i="0" u="none" strike="noStrike" dirty="0">
+                <a:solidFill>
+                  <a:srgbClr val="222222"/>
+                </a:solidFill>
+                <a:effectLst/>
+                <a:latin typeface="Harding"/>
+              </a:rPr>
+              <a:t>correlation coefficient is calculated using the entire expression matrix</a:t>
+            </a:r>
+            <a:r>
+              <a:rPr lang="en-US" b="1" i="0" u="none" strike="noStrike" dirty="0">
+                <a:solidFill>
+                  <a:srgbClr val="222222"/>
+                </a:solidFill>
+                <a:effectLst/>
+                <a:latin typeface="Harding"/>
+              </a:rPr>
+              <a:t>, including dropouts</a:t>
+            </a:r>
+            <a:r>
+              <a:rPr lang="en-US" b="0" i="0" u="none" strike="noStrike" dirty="0">
+                <a:solidFill>
+                  <a:srgbClr val="222222"/>
+                </a:solidFill>
+                <a:effectLst/>
+                <a:latin typeface="Harding"/>
+              </a:rPr>
+              <a:t>. This avoids situations in which the correlation coefficient is determined by a small subset of cells with positive expression in the two genes being assessed. However, it is also possible to mask the cells that are involved in a dropout event for any of the two genes.</a:t>
+            </a:r>
+            <a:endParaRPr lang="en-IL" dirty="0"/>
           </a:p>
           <a:p>
             <a:endParaRPr lang="en-IL" dirty="0"/>
@@ -4717,7 +5578,7 @@
           <a:p>
             <a:fld id="{EA38F353-CEFF-2A41-859E-747C5F5B5087}" type="datetimeFigureOut">
               <a:rPr lang="en-IL" smtClean="0"/>
-              <a:t>14/04/2023</a:t>
+              <a:t>21/04/2023</a:t>
             </a:fld>
             <a:endParaRPr lang="en-IL"/>
           </a:p>
@@ -4917,7 +5778,7 @@
           <a:p>
             <a:fld id="{EA38F353-CEFF-2A41-859E-747C5F5B5087}" type="datetimeFigureOut">
               <a:rPr lang="en-IL" smtClean="0"/>
-              <a:t>14/04/2023</a:t>
+              <a:t>21/04/2023</a:t>
             </a:fld>
             <a:endParaRPr lang="en-IL"/>
           </a:p>
@@ -5127,7 +5988,7 @@
           <a:p>
             <a:fld id="{EA38F353-CEFF-2A41-859E-747C5F5B5087}" type="datetimeFigureOut">
               <a:rPr lang="en-IL" smtClean="0"/>
-              <a:t>14/04/2023</a:t>
+              <a:t>21/04/2023</a:t>
             </a:fld>
             <a:endParaRPr lang="en-IL"/>
           </a:p>
@@ -5327,7 +6188,7 @@
           <a:p>
             <a:fld id="{EA38F353-CEFF-2A41-859E-747C5F5B5087}" type="datetimeFigureOut">
               <a:rPr lang="en-IL" smtClean="0"/>
-              <a:t>14/04/2023</a:t>
+              <a:t>21/04/2023</a:t>
             </a:fld>
             <a:endParaRPr lang="en-IL"/>
           </a:p>
@@ -5603,7 +6464,7 @@
           <a:p>
             <a:fld id="{EA38F353-CEFF-2A41-859E-747C5F5B5087}" type="datetimeFigureOut">
               <a:rPr lang="en-IL" smtClean="0"/>
-              <a:t>14/04/2023</a:t>
+              <a:t>21/04/2023</a:t>
             </a:fld>
             <a:endParaRPr lang="en-IL"/>
           </a:p>
@@ -5871,7 +6732,7 @@
           <a:p>
             <a:fld id="{EA38F353-CEFF-2A41-859E-747C5F5B5087}" type="datetimeFigureOut">
               <a:rPr lang="en-IL" smtClean="0"/>
-              <a:t>14/04/2023</a:t>
+              <a:t>21/04/2023</a:t>
             </a:fld>
             <a:endParaRPr lang="en-IL"/>
           </a:p>
@@ -6286,7 +7147,7 @@
           <a:p>
             <a:fld id="{EA38F353-CEFF-2A41-859E-747C5F5B5087}" type="datetimeFigureOut">
               <a:rPr lang="en-IL" smtClean="0"/>
-              <a:t>14/04/2023</a:t>
+              <a:t>21/04/2023</a:t>
             </a:fld>
             <a:endParaRPr lang="en-IL"/>
           </a:p>
@@ -6428,7 +7289,7 @@
           <a:p>
             <a:fld id="{EA38F353-CEFF-2A41-859E-747C5F5B5087}" type="datetimeFigureOut">
               <a:rPr lang="en-IL" smtClean="0"/>
-              <a:t>14/04/2023</a:t>
+              <a:t>21/04/2023</a:t>
             </a:fld>
             <a:endParaRPr lang="en-IL"/>
           </a:p>
@@ -6541,7 +7402,7 @@
           <a:p>
             <a:fld id="{EA38F353-CEFF-2A41-859E-747C5F5B5087}" type="datetimeFigureOut">
               <a:rPr lang="en-IL" smtClean="0"/>
-              <a:t>14/04/2023</a:t>
+              <a:t>21/04/2023</a:t>
             </a:fld>
             <a:endParaRPr lang="en-IL"/>
           </a:p>
@@ -6854,7 +7715,7 @@
           <a:p>
             <a:fld id="{EA38F353-CEFF-2A41-859E-747C5F5B5087}" type="datetimeFigureOut">
               <a:rPr lang="en-IL" smtClean="0"/>
-              <a:t>14/04/2023</a:t>
+              <a:t>21/04/2023</a:t>
             </a:fld>
             <a:endParaRPr lang="en-IL"/>
           </a:p>
@@ -7143,7 +8004,7 @@
           <a:p>
             <a:fld id="{EA38F353-CEFF-2A41-859E-747C5F5B5087}" type="datetimeFigureOut">
               <a:rPr lang="en-IL" smtClean="0"/>
-              <a:t>14/04/2023</a:t>
+              <a:t>21/04/2023</a:t>
             </a:fld>
             <a:endParaRPr lang="en-IL"/>
           </a:p>
@@ -7386,7 +8247,7 @@
           <a:p>
             <a:fld id="{EA38F353-CEFF-2A41-859E-747C5F5B5087}" type="datetimeFigureOut">
               <a:rPr lang="en-IL" smtClean="0"/>
-              <a:t>14/04/2023</a:t>
+              <a:t>21/04/2023</a:t>
             </a:fld>
             <a:endParaRPr lang="en-IL"/>
           </a:p>
@@ -7976,7 +8837,7 @@
                 </a:solidFill>
                 <a:latin typeface="Söhne"/>
               </a:rPr>
-              <a:t>When the average of the last n improvement values drops below 0, the early-stopping criterion is met and no more trees are added to the ensemble</a:t>
+              <a:t>When the average of the last n(=25) improvement values drops below 0, the early-stopping criterion is met and no more trees are added to the ensemble</a:t>
             </a:r>
             <a:endParaRPr lang="en-IL" dirty="0">
               <a:solidFill>
@@ -8489,7 +9350,7 @@
             </a:r>
             <a:r>
               <a:rPr lang="en-IL" dirty="0"/>
-              <a:t> (positive/negative correlation)</a:t>
+              <a:t> (positive/negative correlation) – considering only activators*</a:t>
             </a:r>
             <a:endParaRPr lang="en-IL" sz="2000" dirty="0"/>
           </a:p>
@@ -8510,7 +9371,7 @@
             </a:r>
             <a:r>
               <a:rPr lang="en-IL" i="1" dirty="0"/>
-              <a:t>over 20 genes*</a:t>
+              <a:t>over 20 genes</a:t>
             </a:r>
             <a:endParaRPr lang="en-IL" dirty="0"/>
           </a:p>
@@ -9042,7 +9903,7 @@
           <p:cNvPr id="2" name="Title 1">
             <a:extLst>
               <a:ext uri="{FF2B5EF4-FFF2-40B4-BE49-F238E27FC236}">
-                <a16:creationId xmlns:a16="http://schemas.microsoft.com/office/drawing/2014/main" id="{EA8796E3-5897-6BCF-3BD5-9EDB0FC79002}"/>
+                <a16:creationId xmlns:a16="http://schemas.microsoft.com/office/drawing/2014/main" id="{912B36CD-F51F-F194-10DA-409BAB1BEBC9}"/>
               </a:ext>
             </a:extLst>
           </p:cNvPr>
@@ -9060,7 +9921,7 @@
           <a:p>
             <a:r>
               <a:rPr lang="en-IL" dirty="0"/>
-              <a:t>RcisTarget</a:t>
+              <a:t>RcisTarget (i-cisTarget)</a:t>
             </a:r>
           </a:p>
         </p:txBody>
@@ -9070,7 +9931,7 @@
           <p:cNvPr id="3" name="Content Placeholder 2">
             <a:extLst>
               <a:ext uri="{FF2B5EF4-FFF2-40B4-BE49-F238E27FC236}">
-                <a16:creationId xmlns:a16="http://schemas.microsoft.com/office/drawing/2014/main" id="{81A9A288-F27E-AC34-9132-4BEDF27D7671}"/>
+                <a16:creationId xmlns:a16="http://schemas.microsoft.com/office/drawing/2014/main" id="{3D134900-47B4-01F1-AC4C-2E81118AE39B}"/>
               </a:ext>
             </a:extLst>
           </p:cNvPr>
@@ -9086,60 +9947,50 @@
           <a:bodyPr/>
           <a:lstStyle/>
           <a:p>
-            <a:r>
-              <a:rPr lang="en-US" b="0" i="0" u="none" strike="noStrike" dirty="0">
-                <a:solidFill>
-                  <a:srgbClr val="212121"/>
-                </a:solidFill>
-                <a:effectLst/>
-                <a:latin typeface="Cambria" panose="02040503050406030204" pitchFamily="18" charset="0"/>
-              </a:rPr>
-              <a:t>Selects DNA motifs that are significantly over-represented in the surroundings of the transcription start site (TSS) of the genes in the gene-set </a:t>
-            </a:r>
-          </a:p>
-          <a:p>
-            <a:r>
-              <a:rPr lang="en-US" b="0" i="0" u="none" strike="noStrike" dirty="0">
-                <a:solidFill>
-                  <a:srgbClr val="212121"/>
-                </a:solidFill>
-                <a:effectLst/>
-                <a:latin typeface="Cambria" panose="02040503050406030204" pitchFamily="18" charset="0"/>
-              </a:rPr>
-              <a:t>This is achieved by applying a recovery-based method on a database that contains genome-wide </a:t>
-            </a:r>
-            <a:r>
-              <a:rPr lang="en-US" b="0" i="1" u="none" strike="noStrike" dirty="0">
-                <a:solidFill>
-                  <a:srgbClr val="212121"/>
-                </a:solidFill>
-                <a:effectLst/>
-                <a:latin typeface="Cambria" panose="02040503050406030204" pitchFamily="18" charset="0"/>
-              </a:rPr>
-              <a:t>cross-species</a:t>
-            </a:r>
-            <a:r>
-              <a:rPr lang="en-US" b="0" i="0" u="none" strike="noStrike" dirty="0">
-                <a:solidFill>
-                  <a:srgbClr val="212121"/>
-                </a:solidFill>
-                <a:effectLst/>
-                <a:latin typeface="Cambria" panose="02040503050406030204" pitchFamily="18" charset="0"/>
-              </a:rPr>
-              <a:t> rankings for each motif</a:t>
-            </a:r>
-          </a:p>
-          <a:p>
-            <a:r>
-              <a:rPr lang="en-US" b="0" i="0" u="none" strike="noStrike" dirty="0">
-                <a:solidFill>
-                  <a:srgbClr val="212121"/>
-                </a:solidFill>
-                <a:effectLst/>
-                <a:latin typeface="Cambria" panose="02040503050406030204" pitchFamily="18" charset="0"/>
-              </a:rPr>
-              <a:t> The motifs that are annotated to the corresponding TF and obtain a Normalized Enrichment Score (NES) &gt; 3.0 are retained</a:t>
-            </a:r>
+            <a:pPr marL="514350" indent="-514350">
+              <a:buFont typeface="+mj-lt"/>
+              <a:buAutoNum type="arabicPeriod"/>
+            </a:pPr>
+            <a:r>
+              <a:rPr lang="en-US" dirty="0"/>
+              <a:t>R</a:t>
+            </a:r>
+            <a:r>
+              <a:rPr lang="en-IL" dirty="0"/>
+              <a:t>ank all genes in the genome for their likelyhood of being a target gene of a certain input motif</a:t>
+            </a:r>
+          </a:p>
+          <a:p>
+            <a:pPr marL="514350" indent="-514350">
+              <a:buFont typeface="+mj-lt"/>
+              <a:buAutoNum type="arabicPeriod"/>
+            </a:pPr>
+            <a:r>
+              <a:rPr lang="en-IL" dirty="0"/>
+              <a:t>Genomic ranks of a set of coexpressed genes are plotted in a cumulative recovery curve -&gt; X: motifs by ranks, Y: recovered from data</a:t>
+            </a:r>
+          </a:p>
+          <a:p>
+            <a:pPr marL="514350" indent="-514350">
+              <a:buFont typeface="+mj-lt"/>
+              <a:buAutoNum type="arabicPeriod"/>
+            </a:pPr>
+            <a:r>
+              <a:rPr lang="en-IL" dirty="0"/>
+              <a:t>Calclate AUC, threshold is the first 3% of the ranked genes</a:t>
+            </a:r>
+          </a:p>
+          <a:p>
+            <a:pPr marL="514350" indent="-514350">
+              <a:buFont typeface="+mj-lt"/>
+              <a:buAutoNum type="arabicPeriod"/>
+            </a:pPr>
+            <a:endParaRPr lang="en-IL" dirty="0"/>
+          </a:p>
+          <a:p>
+            <a:pPr marL="0" indent="0">
+              <a:buNone/>
+            </a:pPr>
             <a:endParaRPr lang="en-IL" dirty="0"/>
           </a:p>
         </p:txBody>
@@ -9147,7 +9998,7 @@
     </p:spTree>
     <p:extLst>
       <p:ext uri="{BB962C8B-B14F-4D97-AF65-F5344CB8AC3E}">
-        <p14:creationId xmlns:p14="http://schemas.microsoft.com/office/powerpoint/2010/main" val="577999599"/>
+        <p14:creationId xmlns:p14="http://schemas.microsoft.com/office/powerpoint/2010/main" val="1811413860"/>
       </p:ext>
     </p:extLst>
   </p:cSld>
@@ -9179,7 +10030,7 @@
           <p:cNvPr id="2" name="Title 1">
             <a:extLst>
               <a:ext uri="{FF2B5EF4-FFF2-40B4-BE49-F238E27FC236}">
-                <a16:creationId xmlns:a16="http://schemas.microsoft.com/office/drawing/2014/main" id="{AD2C2D10-FAB9-1CAD-88B9-068EBC1C9F8C}"/>
+                <a16:creationId xmlns:a16="http://schemas.microsoft.com/office/drawing/2014/main" id="{EA8796E3-5897-6BCF-3BD5-9EDB0FC79002}"/>
               </a:ext>
             </a:extLst>
           </p:cNvPr>
@@ -9197,7 +10048,7 @@
           <a:p>
             <a:r>
               <a:rPr lang="en-IL" dirty="0"/>
-              <a:t>RcisTarget </a:t>
+              <a:t>RcisTarget</a:t>
             </a:r>
           </a:p>
         </p:txBody>
@@ -9207,7 +10058,7 @@
           <p:cNvPr id="3" name="Content Placeholder 2">
             <a:extLst>
               <a:ext uri="{FF2B5EF4-FFF2-40B4-BE49-F238E27FC236}">
-                <a16:creationId xmlns:a16="http://schemas.microsoft.com/office/drawing/2014/main" id="{7B6BD8DB-FFA2-8571-76E6-98306B82A7E9}"/>
+                <a16:creationId xmlns:a16="http://schemas.microsoft.com/office/drawing/2014/main" id="{81A9A288-F27E-AC34-9132-4BEDF27D7671}"/>
               </a:ext>
             </a:extLst>
           </p:cNvPr>
@@ -9224,35 +10075,100 @@
           <a:lstStyle/>
           <a:p>
             <a:r>
-              <a:rPr lang="en-IL" dirty="0"/>
-              <a:t>For each motif and gene-set, predict candidate target genes (genes with high ranking)</a:t>
-            </a:r>
-          </a:p>
-          <a:p>
-            <a:r>
-              <a:rPr lang="en-US" dirty="0"/>
-              <a:t>Process described in depth here: </a:t>
-            </a:r>
+              <a:rPr lang="en-US" b="0" i="0" u="none" strike="noStrike" dirty="0">
+                <a:solidFill>
+                  <a:srgbClr val="212121"/>
+                </a:solidFill>
+                <a:effectLst/>
+                <a:latin typeface="Cambria" panose="02040503050406030204" pitchFamily="18" charset="0"/>
+              </a:rPr>
+              <a:t>Selects DNA motifs that are significantly over-represented in the surroundings of the transcription start site (TSS) of the genes in the gene-set </a:t>
+            </a:r>
+          </a:p>
+          <a:p>
+            <a:r>
+              <a:rPr lang="en-US" b="0" i="0" u="none" strike="noStrike" dirty="0">
+                <a:solidFill>
+                  <a:srgbClr val="212121"/>
+                </a:solidFill>
+                <a:effectLst/>
+                <a:latin typeface="Cambria" panose="02040503050406030204" pitchFamily="18" charset="0"/>
+              </a:rPr>
+              <a:t>This is achieved by applying a recovery-based method on a database that contains genome-wide </a:t>
+            </a:r>
+            <a:r>
+              <a:rPr lang="en-US" b="0" i="1" u="none" strike="noStrike" dirty="0">
+                <a:solidFill>
+                  <a:srgbClr val="212121"/>
+                </a:solidFill>
+                <a:effectLst/>
+                <a:latin typeface="Cambria" panose="02040503050406030204" pitchFamily="18" charset="0"/>
+              </a:rPr>
+              <a:t>cross-species</a:t>
+            </a:r>
+            <a:r>
+              <a:rPr lang="en-US" b="0" i="0" u="none" strike="noStrike" dirty="0">
+                <a:solidFill>
+                  <a:srgbClr val="212121"/>
+                </a:solidFill>
+                <a:effectLst/>
+                <a:latin typeface="Cambria" panose="02040503050406030204" pitchFamily="18" charset="0"/>
+              </a:rPr>
+              <a:t> rankings for each motif</a:t>
+            </a:r>
+          </a:p>
+          <a:p>
+            <a:r>
+              <a:rPr lang="en-US" b="0" i="0" u="none" strike="noStrike" dirty="0">
+                <a:solidFill>
+                  <a:srgbClr val="212121"/>
+                </a:solidFill>
+                <a:effectLst/>
+                <a:latin typeface="Cambria" panose="02040503050406030204" pitchFamily="18" charset="0"/>
+              </a:rPr>
+              <a:t> The motifs that are annotated to the corresponding TF and obtain a Normalized Enrichment Score (NES) &gt; 3.0 are retained</a:t>
+            </a:r>
+          </a:p>
+          <a:p>
             <a:r>
               <a:rPr lang="en-US" dirty="0">
-                <a:hlinkClick r:id="rId2"/>
-              </a:rPr>
-              <a:t>https://www.ncbi.nlm.nih.gov/pmc/articles/PMC2910651/</a:t>
-            </a:r>
-            <a:r>
-              <a:rPr lang="en-US" dirty="0"/>
-              <a:t> (</a:t>
-            </a:r>
-            <a:r>
-              <a:rPr lang="en-US" dirty="0" err="1"/>
-              <a:t>cisTargetX</a:t>
-            </a:r>
-            <a:r>
-              <a:rPr lang="en-US" dirty="0"/>
+                <a:solidFill>
+                  <a:srgbClr val="212121"/>
+                </a:solidFill>
+                <a:latin typeface="Cambria" panose="02040503050406030204" pitchFamily="18" charset="0"/>
+              </a:rPr>
+              <a:t>For each motif and gene set- predict candidate target genes (</a:t>
+            </a:r>
+            <a:r>
+              <a:rPr lang="en-US" b="0" i="0" u="none" strike="noStrike" dirty="0">
+                <a:solidFill>
+                  <a:srgbClr val="222222"/>
+                </a:solidFill>
+                <a:effectLst/>
+                <a:latin typeface="Harding"/>
+              </a:rPr>
+              <a:t>genes that are ranked above the </a:t>
+            </a:r>
+            <a:r>
+              <a:rPr lang="en-US" b="0" i="1" u="none" strike="noStrike" dirty="0">
+                <a:solidFill>
+                  <a:srgbClr val="222222"/>
+                </a:solidFill>
+                <a:effectLst/>
+                <a:latin typeface="Harding"/>
+              </a:rPr>
+              <a:t>leading edge</a:t>
+            </a:r>
+            <a:r>
+              <a:rPr lang="en-US" b="0" i="0" u="none" strike="noStrike" dirty="0">
+                <a:solidFill>
+                  <a:srgbClr val="222222"/>
+                </a:solidFill>
+                <a:effectLst/>
+                <a:latin typeface="Harding"/>
+              </a:rPr>
               <a:t>)</a:t>
             </a:r>
-          </a:p>
-          <a:p>
             <a:endParaRPr lang="en-IL" dirty="0"/>
           </a:p>
         </p:txBody>
@@ -9260,7 +10176,7 @@
     </p:spTree>
     <p:extLst>
       <p:ext uri="{BB962C8B-B14F-4D97-AF65-F5344CB8AC3E}">
-        <p14:creationId xmlns:p14="http://schemas.microsoft.com/office/powerpoint/2010/main" val="2771368644"/>
+        <p14:creationId xmlns:p14="http://schemas.microsoft.com/office/powerpoint/2010/main" val="577999599"/>
       </p:ext>
     </p:extLst>
   </p:cSld>
@@ -10730,6 +11646,308 @@
           <p:cNvPr id="2" name="Title 1">
             <a:extLst>
               <a:ext uri="{FF2B5EF4-FFF2-40B4-BE49-F238E27FC236}">
+                <a16:creationId xmlns:a16="http://schemas.microsoft.com/office/drawing/2014/main" id="{2CAF7AE6-3891-7FA1-6E6B-5B420A50492A}"/>
+              </a:ext>
+            </a:extLst>
+          </p:cNvPr>
+          <p:cNvSpPr>
+            <a:spLocks noGrp="1"/>
+          </p:cNvSpPr>
+          <p:nvPr>
+            <p:ph type="title"/>
+          </p:nvPr>
+        </p:nvSpPr>
+        <p:spPr/>
+        <p:txBody>
+          <a:bodyPr/>
+          <a:lstStyle/>
+          <a:p>
+            <a:r>
+              <a:rPr lang="en-IL" dirty="0"/>
+              <a:t>AUCell– possible limitations</a:t>
+            </a:r>
+          </a:p>
+        </p:txBody>
+      </p:sp>
+      <p:sp>
+        <p:nvSpPr>
+          <p:cNvPr id="6" name="Content Placeholder 5">
+            <a:extLst>
+              <a:ext uri="{FF2B5EF4-FFF2-40B4-BE49-F238E27FC236}">
+                <a16:creationId xmlns:a16="http://schemas.microsoft.com/office/drawing/2014/main" id="{87E464A8-2069-5423-0092-A47B2AB8D2D6}"/>
+              </a:ext>
+            </a:extLst>
+          </p:cNvPr>
+          <p:cNvSpPr>
+            <a:spLocks noGrp="1"/>
+          </p:cNvSpPr>
+          <p:nvPr>
+            <p:ph idx="1"/>
+          </p:nvPr>
+        </p:nvSpPr>
+        <p:spPr/>
+        <p:txBody>
+          <a:bodyPr/>
+          <a:lstStyle/>
+          <a:p>
+            <a:pPr marL="0" indent="0" algn="l">
+              <a:buNone/>
+            </a:pPr>
+            <a:r>
+              <a:rPr lang="en-US" b="1" i="0" u="none" strike="noStrike" dirty="0" err="1">
+                <a:solidFill>
+                  <a:srgbClr val="222222"/>
+                </a:solidFill>
+                <a:effectLst/>
+                <a:latin typeface="-apple-system"/>
+              </a:rPr>
+              <a:t>AUCell</a:t>
+            </a:r>
+            <a:r>
+              <a:rPr lang="en-US" b="1" i="0" u="none" strike="noStrike" dirty="0">
+                <a:solidFill>
+                  <a:srgbClr val="222222"/>
+                </a:solidFill>
+                <a:effectLst/>
+                <a:latin typeface="-apple-system"/>
+              </a:rPr>
+              <a:t> (Step 7) provides minimal comparability</a:t>
+            </a:r>
+          </a:p>
+          <a:p>
+            <a:pPr marL="0" indent="0" algn="l">
+              <a:buNone/>
+            </a:pPr>
+            <a:r>
+              <a:rPr lang="en-US" b="0" i="0" u="none" strike="noStrike" dirty="0">
+                <a:solidFill>
+                  <a:srgbClr val="222222"/>
+                </a:solidFill>
+                <a:effectLst/>
+                <a:latin typeface="Harding"/>
+              </a:rPr>
+              <a:t>The metric used by </a:t>
+            </a:r>
+            <a:r>
+              <a:rPr lang="en-US" b="0" i="0" u="none" strike="noStrike" dirty="0" err="1">
+                <a:solidFill>
+                  <a:srgbClr val="222222"/>
+                </a:solidFill>
+                <a:effectLst/>
+                <a:latin typeface="Harding"/>
+              </a:rPr>
+              <a:t>AUCell</a:t>
+            </a:r>
+            <a:r>
+              <a:rPr lang="en-US" b="0" i="0" u="none" strike="noStrike" dirty="0">
+                <a:solidFill>
+                  <a:srgbClr val="222222"/>
+                </a:solidFill>
+                <a:effectLst/>
+                <a:latin typeface="Harding"/>
+              </a:rPr>
+              <a:t> to quantify the activity of a predicted regulon in individual cells of an experiment is an </a:t>
+            </a:r>
+            <a:r>
+              <a:rPr lang="en-US" b="0" i="0" u="sng" strike="noStrike" dirty="0">
+                <a:solidFill>
+                  <a:srgbClr val="222222"/>
+                </a:solidFill>
+                <a:effectLst/>
+                <a:latin typeface="Harding"/>
+              </a:rPr>
+              <a:t>unnormalized enrichment score</a:t>
+            </a:r>
+            <a:r>
+              <a:rPr lang="en-US" b="0" i="0" u="none" strike="noStrike" dirty="0">
+                <a:solidFill>
+                  <a:srgbClr val="222222"/>
+                </a:solidFill>
+                <a:effectLst/>
+                <a:latin typeface="Harding"/>
+              </a:rPr>
+              <a:t>. Therefore, </a:t>
+            </a:r>
+            <a:r>
+              <a:rPr lang="en-US" b="0" i="0" u="none" strike="noStrike" dirty="0">
+                <a:solidFill>
+                  <a:srgbClr val="222222"/>
+                </a:solidFill>
+                <a:effectLst/>
+                <a:highlight>
+                  <a:srgbClr val="FFFF00"/>
+                </a:highlight>
+                <a:latin typeface="Harding"/>
+              </a:rPr>
+              <a:t>it can only be used to compare the activity of a regulon across cells of the same experiment</a:t>
+            </a:r>
+            <a:r>
+              <a:rPr lang="en-US" b="0" i="0" u="none" strike="noStrike" dirty="0">
+                <a:solidFill>
+                  <a:srgbClr val="222222"/>
+                </a:solidFill>
+                <a:effectLst/>
+                <a:latin typeface="Harding"/>
+              </a:rPr>
+              <a:t>. Because the enrichment score is not normalized for the size of the predicted </a:t>
+            </a:r>
+            <a:r>
+              <a:rPr lang="en-US" b="0" i="0" u="none" strike="noStrike" dirty="0" err="1">
+                <a:solidFill>
+                  <a:srgbClr val="222222"/>
+                </a:solidFill>
+                <a:effectLst/>
+                <a:latin typeface="Harding"/>
+              </a:rPr>
+              <a:t>targetome</a:t>
+            </a:r>
+            <a:r>
+              <a:rPr lang="en-US" b="0" i="0" u="none" strike="noStrike" dirty="0">
+                <a:solidFill>
+                  <a:srgbClr val="222222"/>
+                </a:solidFill>
+                <a:effectLst/>
+                <a:latin typeface="Harding"/>
+              </a:rPr>
+              <a:t>, the scores of different regulons cannot be compared.</a:t>
+            </a:r>
+          </a:p>
+          <a:p>
+            <a:pPr marL="0" indent="0">
+              <a:buNone/>
+            </a:pPr>
+            <a:br>
+              <a:rPr lang="en-US" dirty="0"/>
+            </a:br>
+            <a:r>
+              <a:rPr lang="en-US" dirty="0"/>
+              <a:t>* Different time points - batch effect is taken care of, should be ok? </a:t>
+            </a:r>
+            <a:endParaRPr lang="en-IL" dirty="0"/>
+          </a:p>
+        </p:txBody>
+      </p:sp>
+    </p:spTree>
+    <p:extLst>
+      <p:ext uri="{BB962C8B-B14F-4D97-AF65-F5344CB8AC3E}">
+        <p14:creationId xmlns:p14="http://schemas.microsoft.com/office/powerpoint/2010/main" val="3655704882"/>
+      </p:ext>
+    </p:extLst>
+  </p:cSld>
+  <p:clrMapOvr>
+    <a:masterClrMapping/>
+  </p:clrMapOvr>
+</p:sld>
+</file>
+
+<file path=ppt/slides/slide26.xml><?xml version="1.0" encoding="utf-8"?>
+<p:sld xmlns:a="http://schemas.openxmlformats.org/drawingml/2006/main" xmlns:r="http://schemas.openxmlformats.org/officeDocument/2006/relationships" xmlns:p="http://schemas.openxmlformats.org/presentationml/2006/main">
+  <p:cSld>
+    <p:spTree>
+      <p:nvGrpSpPr>
+        <p:cNvPr id="1" name=""/>
+        <p:cNvGrpSpPr/>
+        <p:nvPr/>
+      </p:nvGrpSpPr>
+      <p:grpSpPr>
+        <a:xfrm>
+          <a:off x="0" y="0"/>
+          <a:ext cx="0" cy="0"/>
+          <a:chOff x="0" y="0"/>
+          <a:chExt cx="0" cy="0"/>
+        </a:xfrm>
+      </p:grpSpPr>
+      <p:sp>
+        <p:nvSpPr>
+          <p:cNvPr id="2" name="Title 1">
+            <a:extLst>
+              <a:ext uri="{FF2B5EF4-FFF2-40B4-BE49-F238E27FC236}">
+                <a16:creationId xmlns:a16="http://schemas.microsoft.com/office/drawing/2014/main" id="{BB1296EA-E2E5-3006-EBB0-87DD92C1CA09}"/>
+              </a:ext>
+            </a:extLst>
+          </p:cNvPr>
+          <p:cNvSpPr>
+            <a:spLocks noGrp="1"/>
+          </p:cNvSpPr>
+          <p:nvPr>
+            <p:ph type="title"/>
+          </p:nvPr>
+        </p:nvSpPr>
+        <p:spPr/>
+        <p:txBody>
+          <a:bodyPr/>
+          <a:lstStyle/>
+          <a:p>
+            <a:pPr marL="0" indent="0">
+              <a:buNone/>
+            </a:pPr>
+            <a:r>
+              <a:rPr lang="en-IL" dirty="0"/>
+              <a:t>Further Analysis</a:t>
+            </a:r>
+          </a:p>
+        </p:txBody>
+      </p:sp>
+      <p:sp>
+        <p:nvSpPr>
+          <p:cNvPr id="3" name="Text Placeholder 2">
+            <a:extLst>
+              <a:ext uri="{FF2B5EF4-FFF2-40B4-BE49-F238E27FC236}">
+                <a16:creationId xmlns:a16="http://schemas.microsoft.com/office/drawing/2014/main" id="{8EA09FDE-D469-321F-81B9-9F7513986866}"/>
+              </a:ext>
+            </a:extLst>
+          </p:cNvPr>
+          <p:cNvSpPr>
+            <a:spLocks noGrp="1"/>
+          </p:cNvSpPr>
+          <p:nvPr>
+            <p:ph type="body" idx="1"/>
+          </p:nvPr>
+        </p:nvSpPr>
+        <p:spPr/>
+        <p:txBody>
+          <a:bodyPr/>
+          <a:lstStyle/>
+          <a:p>
+            <a:endParaRPr lang="en-IL" dirty="0"/>
+          </a:p>
+        </p:txBody>
+      </p:sp>
+    </p:spTree>
+    <p:extLst>
+      <p:ext uri="{BB962C8B-B14F-4D97-AF65-F5344CB8AC3E}">
+        <p14:creationId xmlns:p14="http://schemas.microsoft.com/office/powerpoint/2010/main" val="3424868785"/>
+      </p:ext>
+    </p:extLst>
+  </p:cSld>
+  <p:clrMapOvr>
+    <a:masterClrMapping/>
+  </p:clrMapOvr>
+</p:sld>
+</file>
+
+<file path=ppt/slides/slide27.xml><?xml version="1.0" encoding="utf-8"?>
+<p:sld xmlns:a="http://schemas.openxmlformats.org/drawingml/2006/main" xmlns:r="http://schemas.openxmlformats.org/officeDocument/2006/relationships" xmlns:p="http://schemas.openxmlformats.org/presentationml/2006/main">
+  <p:cSld>
+    <p:spTree>
+      <p:nvGrpSpPr>
+        <p:cNvPr id="1" name=""/>
+        <p:cNvGrpSpPr/>
+        <p:nvPr/>
+      </p:nvGrpSpPr>
+      <p:grpSpPr>
+        <a:xfrm>
+          <a:off x="0" y="0"/>
+          <a:ext cx="0" cy="0"/>
+          <a:chOff x="0" y="0"/>
+          <a:chExt cx="0" cy="0"/>
+        </a:xfrm>
+      </p:grpSpPr>
+      <p:sp>
+        <p:nvSpPr>
+          <p:cNvPr id="2" name="Title 1">
+            <a:extLst>
+              <a:ext uri="{FF2B5EF4-FFF2-40B4-BE49-F238E27FC236}">
                 <a16:creationId xmlns:a16="http://schemas.microsoft.com/office/drawing/2014/main" id="{67F302C5-4331-0437-B00F-71664D09714B}"/>
               </a:ext>
             </a:extLst>
@@ -10748,7 +11966,7 @@
           <a:p>
             <a:r>
               <a:rPr lang="en-IL" dirty="0"/>
-              <a:t>AUCell - questions</a:t>
+              <a:t>AUCell – further analysis</a:t>
             </a:r>
           </a:p>
         </p:txBody>
@@ -10776,7 +11994,7 @@
           <a:p>
             <a:r>
               <a:rPr lang="en-IL" dirty="0"/>
-              <a:t>Two uses to output:</a:t>
+              <a:t>Two uses of AUCell values</a:t>
             </a:r>
           </a:p>
           <a:p>
@@ -10801,47 +12019,6 @@
           </a:p>
           <a:p>
             <a:endParaRPr lang="en-US" dirty="0"/>
-          </a:p>
-          <a:p>
-            <a:r>
-              <a:rPr lang="en-US" dirty="0">
-                <a:highlight>
-                  <a:srgbClr val="FFFF00"/>
-                </a:highlight>
-              </a:rPr>
-              <a:t>I thought: to decide on a cutoff and create binary matrix, and choose % of similar regulons that appear </a:t>
-            </a:r>
-            <a:r>
-              <a:rPr lang="en-US" u="sng" dirty="0">
-                <a:highlight>
-                  <a:srgbClr val="FFFF00"/>
-                </a:highlight>
-              </a:rPr>
-              <a:t>per cell</a:t>
-            </a:r>
-            <a:r>
-              <a:rPr lang="en-US" dirty="0">
-                <a:highlight>
-                  <a:srgbClr val="FFFF00"/>
-                </a:highlight>
-              </a:rPr>
-              <a:t> -&gt; how do I choose cutoff? Paper said it can be chosen automatically but idk how yet. </a:t>
-            </a:r>
-          </a:p>
-          <a:p>
-            <a:r>
-              <a:rPr lang="en-US" dirty="0"/>
-              <a:t>What happens to </a:t>
-            </a:r>
-            <a:r>
-              <a:rPr lang="en-US" u="sng" dirty="0"/>
-              <a:t>suppressors? Genes should be ranked low, isn’t that a problem?</a:t>
-            </a:r>
-            <a:r>
-              <a:rPr lang="en-US" dirty="0"/>
-              <a:t> =&gt; we consider only activators. </a:t>
-            </a:r>
-            <a:endParaRPr lang="en-US" u="sng" dirty="0"/>
           </a:p>
           <a:p>
             <a:pPr marL="457200" lvl="1" indent="0">
@@ -10868,6 +12045,370 @@
     <p:extLst>
       <p:ext uri="{BB962C8B-B14F-4D97-AF65-F5344CB8AC3E}">
         <p14:creationId xmlns:p14="http://schemas.microsoft.com/office/powerpoint/2010/main" val="779796953"/>
+      </p:ext>
+    </p:extLst>
+  </p:cSld>
+  <p:clrMapOvr>
+    <a:masterClrMapping/>
+  </p:clrMapOvr>
+</p:sld>
+</file>
+
+<file path=ppt/slides/slide28.xml><?xml version="1.0" encoding="utf-8"?>
+<p:sld xmlns:a="http://schemas.openxmlformats.org/drawingml/2006/main" xmlns:r="http://schemas.openxmlformats.org/officeDocument/2006/relationships" xmlns:p="http://schemas.openxmlformats.org/presentationml/2006/main">
+  <p:cSld>
+    <p:spTree>
+      <p:nvGrpSpPr>
+        <p:cNvPr id="1" name=""/>
+        <p:cNvGrpSpPr/>
+        <p:nvPr/>
+      </p:nvGrpSpPr>
+      <p:grpSpPr>
+        <a:xfrm>
+          <a:off x="0" y="0"/>
+          <a:ext cx="0" cy="0"/>
+          <a:chOff x="0" y="0"/>
+          <a:chExt cx="0" cy="0"/>
+        </a:xfrm>
+      </p:grpSpPr>
+      <p:sp>
+        <p:nvSpPr>
+          <p:cNvPr id="2" name="Title 1">
+            <a:extLst>
+              <a:ext uri="{FF2B5EF4-FFF2-40B4-BE49-F238E27FC236}">
+                <a16:creationId xmlns:a16="http://schemas.microsoft.com/office/drawing/2014/main" id="{EEB8AD68-4109-046D-313B-B957551BF5DE}"/>
+              </a:ext>
+            </a:extLst>
+          </p:cNvPr>
+          <p:cNvSpPr>
+            <a:spLocks noGrp="1"/>
+          </p:cNvSpPr>
+          <p:nvPr>
+            <p:ph type="title"/>
+          </p:nvPr>
+        </p:nvSpPr>
+        <p:spPr/>
+        <p:txBody>
+          <a:bodyPr/>
+          <a:lstStyle/>
+          <a:p>
+            <a:r>
+              <a:rPr lang="en-IL" dirty="0"/>
+              <a:t>Regulon activity  - </a:t>
+            </a:r>
+            <a:br>
+              <a:rPr lang="en-IL" dirty="0"/>
+            </a:br>
+            <a:r>
+              <a:rPr lang="en-IL" dirty="0"/>
+              <a:t>heatmap</a:t>
+            </a:r>
+          </a:p>
+        </p:txBody>
+      </p:sp>
+      <p:sp>
+        <p:nvSpPr>
+          <p:cNvPr id="5" name="TextBox 4">
+            <a:extLst>
+              <a:ext uri="{FF2B5EF4-FFF2-40B4-BE49-F238E27FC236}">
+                <a16:creationId xmlns:a16="http://schemas.microsoft.com/office/drawing/2014/main" id="{A75145A3-D2DE-274E-776D-5B408653E1BF}"/>
+              </a:ext>
+            </a:extLst>
+          </p:cNvPr>
+          <p:cNvSpPr txBox="1"/>
+          <p:nvPr/>
+        </p:nvSpPr>
+        <p:spPr>
+          <a:xfrm>
+            <a:off x="369427" y="1690688"/>
+            <a:ext cx="5817243" cy="369332"/>
+          </a:xfrm>
+          <a:prstGeom prst="rect">
+            <a:avLst/>
+          </a:prstGeom>
+          <a:noFill/>
+        </p:spPr>
+        <p:txBody>
+          <a:bodyPr wrap="square">
+            <a:spAutoFit/>
+          </a:bodyPr>
+          <a:lstStyle/>
+          <a:p>
+            <a:r>
+              <a:rPr lang="en-US" b="0" dirty="0" err="1">
+                <a:solidFill>
+                  <a:srgbClr val="4EC9B0"/>
+                </a:solidFill>
+                <a:effectLst/>
+                <a:latin typeface="Menlo" panose="020B0609030804020204" pitchFamily="49" charset="0"/>
+              </a:rPr>
+              <a:t>sns</a:t>
+            </a:r>
+            <a:r>
+              <a:rPr lang="en-US" b="0" dirty="0" err="1">
+                <a:solidFill>
+                  <a:srgbClr val="D4D4D4"/>
+                </a:solidFill>
+                <a:effectLst/>
+                <a:latin typeface="Menlo" panose="020B0609030804020204" pitchFamily="49" charset="0"/>
+              </a:rPr>
+              <a:t>.clustermap</a:t>
+            </a:r>
+            <a:r>
+              <a:rPr lang="en-US" b="0" dirty="0">
+                <a:solidFill>
+                  <a:srgbClr val="D4D4D4"/>
+                </a:solidFill>
+                <a:effectLst/>
+                <a:latin typeface="Menlo" panose="020B0609030804020204" pitchFamily="49" charset="0"/>
+              </a:rPr>
+              <a:t>(</a:t>
+            </a:r>
+            <a:r>
+              <a:rPr lang="en-US" b="0" dirty="0" err="1">
+                <a:solidFill>
+                  <a:srgbClr val="9CDCFE"/>
+                </a:solidFill>
+                <a:effectLst/>
+                <a:latin typeface="Menlo" panose="020B0609030804020204" pitchFamily="49" charset="0"/>
+              </a:rPr>
+              <a:t>auc_ntx</a:t>
+            </a:r>
+            <a:r>
+              <a:rPr lang="en-US" b="0" dirty="0">
+                <a:solidFill>
+                  <a:srgbClr val="D4D4D4"/>
+                </a:solidFill>
+                <a:effectLst/>
+                <a:latin typeface="Menlo" panose="020B0609030804020204" pitchFamily="49" charset="0"/>
+              </a:rPr>
+              <a:t>, </a:t>
+            </a:r>
+            <a:r>
+              <a:rPr lang="en-US" b="0" dirty="0" err="1">
+                <a:solidFill>
+                  <a:srgbClr val="9CDCFE"/>
+                </a:solidFill>
+                <a:effectLst/>
+                <a:latin typeface="Menlo" panose="020B0609030804020204" pitchFamily="49" charset="0"/>
+              </a:rPr>
+              <a:t>figsize</a:t>
+            </a:r>
+            <a:r>
+              <a:rPr lang="en-US" b="0" dirty="0">
+                <a:solidFill>
+                  <a:srgbClr val="D4D4D4"/>
+                </a:solidFill>
+                <a:effectLst/>
+                <a:latin typeface="Menlo" panose="020B0609030804020204" pitchFamily="49" charset="0"/>
+              </a:rPr>
+              <a:t>=(</a:t>
+            </a:r>
+            <a:r>
+              <a:rPr lang="en-US" b="0" dirty="0">
+                <a:solidFill>
+                  <a:srgbClr val="B5CEA8"/>
+                </a:solidFill>
+                <a:effectLst/>
+                <a:latin typeface="Menlo" panose="020B0609030804020204" pitchFamily="49" charset="0"/>
+              </a:rPr>
+              <a:t>12</a:t>
+            </a:r>
+            <a:r>
+              <a:rPr lang="en-US" b="0" dirty="0">
+                <a:solidFill>
+                  <a:srgbClr val="D4D4D4"/>
+                </a:solidFill>
+                <a:effectLst/>
+                <a:latin typeface="Menlo" panose="020B0609030804020204" pitchFamily="49" charset="0"/>
+              </a:rPr>
+              <a:t>,</a:t>
+            </a:r>
+            <a:r>
+              <a:rPr lang="en-US" b="0" dirty="0">
+                <a:solidFill>
+                  <a:srgbClr val="B5CEA8"/>
+                </a:solidFill>
+                <a:effectLst/>
+                <a:latin typeface="Menlo" panose="020B0609030804020204" pitchFamily="49" charset="0"/>
+              </a:rPr>
+              <a:t>12</a:t>
+            </a:r>
+            <a:r>
+              <a:rPr lang="en-US" b="0" dirty="0">
+                <a:solidFill>
+                  <a:srgbClr val="D4D4D4"/>
+                </a:solidFill>
+                <a:effectLst/>
+                <a:latin typeface="Menlo" panose="020B0609030804020204" pitchFamily="49" charset="0"/>
+              </a:rPr>
+              <a:t>))</a:t>
+            </a:r>
+          </a:p>
+        </p:txBody>
+      </p:sp>
+      <p:pic>
+        <p:nvPicPr>
+          <p:cNvPr id="3" name="Picture 2">
+            <a:extLst>
+              <a:ext uri="{FF2B5EF4-FFF2-40B4-BE49-F238E27FC236}">
+                <a16:creationId xmlns:a16="http://schemas.microsoft.com/office/drawing/2014/main" id="{D66212CC-E08A-F19E-9666-79B1FFF63468}"/>
+              </a:ext>
+            </a:extLst>
+          </p:cNvPr>
+          <p:cNvPicPr>
+            <a:picLocks noChangeAspect="1"/>
+          </p:cNvPicPr>
+          <p:nvPr/>
+        </p:nvPicPr>
+        <p:blipFill>
+          <a:blip r:embed="rId3"/>
+          <a:stretch>
+            <a:fillRect/>
+          </a:stretch>
+        </p:blipFill>
+        <p:spPr>
+          <a:xfrm>
+            <a:off x="6186670" y="458844"/>
+            <a:ext cx="5982343" cy="5940312"/>
+          </a:xfrm>
+          <a:prstGeom prst="rect">
+            <a:avLst/>
+          </a:prstGeom>
+        </p:spPr>
+      </p:pic>
+      <p:sp>
+        <p:nvSpPr>
+          <p:cNvPr id="4" name="TextBox 3">
+            <a:extLst>
+              <a:ext uri="{FF2B5EF4-FFF2-40B4-BE49-F238E27FC236}">
+                <a16:creationId xmlns:a16="http://schemas.microsoft.com/office/drawing/2014/main" id="{C0CF67EB-464E-72A9-D150-2E6495562F0F}"/>
+              </a:ext>
+            </a:extLst>
+          </p:cNvPr>
+          <p:cNvSpPr txBox="1"/>
+          <p:nvPr/>
+        </p:nvSpPr>
+        <p:spPr>
+          <a:xfrm>
+            <a:off x="369427" y="2257327"/>
+            <a:ext cx="5635904" cy="646331"/>
+          </a:xfrm>
+          <a:prstGeom prst="rect">
+            <a:avLst/>
+          </a:prstGeom>
+          <a:noFill/>
+        </p:spPr>
+        <p:txBody>
+          <a:bodyPr wrap="square" rtlCol="0">
+            <a:spAutoFit/>
+          </a:bodyPr>
+          <a:lstStyle/>
+          <a:p>
+            <a:r>
+              <a:rPr lang="en-IL" dirty="0"/>
+              <a:t>Visualizatio of the AUCell table as heatmap</a:t>
+            </a:r>
+          </a:p>
+          <a:p>
+            <a:endParaRPr lang="en-IL" dirty="0"/>
+          </a:p>
+        </p:txBody>
+      </p:sp>
+    </p:spTree>
+    <p:extLst>
+      <p:ext uri="{BB962C8B-B14F-4D97-AF65-F5344CB8AC3E}">
+        <p14:creationId xmlns:p14="http://schemas.microsoft.com/office/powerpoint/2010/main" val="532821761"/>
+      </p:ext>
+    </p:extLst>
+  </p:cSld>
+  <p:clrMapOvr>
+    <a:masterClrMapping/>
+  </p:clrMapOvr>
+</p:sld>
+</file>
+
+<file path=ppt/slides/slide29.xml><?xml version="1.0" encoding="utf-8"?>
+<p:sld xmlns:a="http://schemas.openxmlformats.org/drawingml/2006/main" xmlns:r="http://schemas.openxmlformats.org/officeDocument/2006/relationships" xmlns:p="http://schemas.openxmlformats.org/presentationml/2006/main">
+  <p:cSld>
+    <p:spTree>
+      <p:nvGrpSpPr>
+        <p:cNvPr id="1" name=""/>
+        <p:cNvGrpSpPr/>
+        <p:nvPr/>
+      </p:nvGrpSpPr>
+      <p:grpSpPr>
+        <a:xfrm>
+          <a:off x="0" y="0"/>
+          <a:ext cx="0" cy="0"/>
+          <a:chOff x="0" y="0"/>
+          <a:chExt cx="0" cy="0"/>
+        </a:xfrm>
+      </p:grpSpPr>
+      <p:sp>
+        <p:nvSpPr>
+          <p:cNvPr id="2" name="Title 1">
+            <a:extLst>
+              <a:ext uri="{FF2B5EF4-FFF2-40B4-BE49-F238E27FC236}">
+                <a16:creationId xmlns:a16="http://schemas.microsoft.com/office/drawing/2014/main" id="{923F0517-E610-59FC-E457-5A9A5845FEFF}"/>
+              </a:ext>
+            </a:extLst>
+          </p:cNvPr>
+          <p:cNvSpPr>
+            <a:spLocks noGrp="1"/>
+          </p:cNvSpPr>
+          <p:nvPr>
+            <p:ph type="title"/>
+          </p:nvPr>
+        </p:nvSpPr>
+        <p:spPr/>
+        <p:txBody>
+          <a:bodyPr/>
+          <a:lstStyle/>
+          <a:p>
+            <a:r>
+              <a:rPr lang="en-IL" dirty="0"/>
+              <a:t>AUCell – from pySCENIC FAQ</a:t>
+            </a:r>
+          </a:p>
+        </p:txBody>
+      </p:sp>
+      <p:pic>
+        <p:nvPicPr>
+          <p:cNvPr id="4" name="Content Placeholder 3">
+            <a:extLst>
+              <a:ext uri="{FF2B5EF4-FFF2-40B4-BE49-F238E27FC236}">
+                <a16:creationId xmlns:a16="http://schemas.microsoft.com/office/drawing/2014/main" id="{00BBECD4-FB36-DFB4-BF76-6FE6971D6B9A}"/>
+              </a:ext>
+            </a:extLst>
+          </p:cNvPr>
+          <p:cNvPicPr>
+            <a:picLocks noGrp="1" noChangeAspect="1"/>
+          </p:cNvPicPr>
+          <p:nvPr>
+            <p:ph idx="1"/>
+          </p:nvPr>
+        </p:nvPicPr>
+        <p:blipFill>
+          <a:blip r:embed="rId3"/>
+          <a:stretch>
+            <a:fillRect/>
+          </a:stretch>
+        </p:blipFill>
+        <p:spPr>
+          <a:xfrm>
+            <a:off x="2879794" y="1825625"/>
+            <a:ext cx="6432412" cy="4351338"/>
+          </a:xfrm>
+          <a:prstGeom prst="rect">
+            <a:avLst/>
+          </a:prstGeom>
+        </p:spPr>
+      </p:pic>
+    </p:spTree>
+    <p:extLst>
+      <p:ext uri="{BB962C8B-B14F-4D97-AF65-F5344CB8AC3E}">
+        <p14:creationId xmlns:p14="http://schemas.microsoft.com/office/powerpoint/2010/main" val="545550036"/>
       </p:ext>
     </p:extLst>
   </p:cSld>
@@ -10963,6 +12504,328 @@
 </p:sld>
 </file>
 
+<file path=ppt/slides/slide30.xml><?xml version="1.0" encoding="utf-8"?>
+<p:sld xmlns:a="http://schemas.openxmlformats.org/drawingml/2006/main" xmlns:r="http://schemas.openxmlformats.org/officeDocument/2006/relationships" xmlns:p="http://schemas.openxmlformats.org/presentationml/2006/main">
+  <p:cSld>
+    <p:spTree>
+      <p:nvGrpSpPr>
+        <p:cNvPr id="1" name=""/>
+        <p:cNvGrpSpPr/>
+        <p:nvPr/>
+      </p:nvGrpSpPr>
+      <p:grpSpPr>
+        <a:xfrm>
+          <a:off x="0" y="0"/>
+          <a:ext cx="0" cy="0"/>
+          <a:chOff x="0" y="0"/>
+          <a:chExt cx="0" cy="0"/>
+        </a:xfrm>
+      </p:grpSpPr>
+      <p:sp>
+        <p:nvSpPr>
+          <p:cNvPr id="2" name="Title 1">
+            <a:extLst>
+              <a:ext uri="{FF2B5EF4-FFF2-40B4-BE49-F238E27FC236}">
+                <a16:creationId xmlns:a16="http://schemas.microsoft.com/office/drawing/2014/main" id="{9A04B085-1AF7-7CDF-6C5B-78B07CC33A69}"/>
+              </a:ext>
+            </a:extLst>
+          </p:cNvPr>
+          <p:cNvSpPr>
+            <a:spLocks noGrp="1"/>
+          </p:cNvSpPr>
+          <p:nvPr>
+            <p:ph type="title"/>
+          </p:nvPr>
+        </p:nvSpPr>
+        <p:spPr/>
+        <p:txBody>
+          <a:bodyPr/>
+          <a:lstStyle/>
+          <a:p>
+            <a:r>
+              <a:rPr lang="en-IL" dirty="0"/>
+              <a:t>Threshold per regulon</a:t>
+            </a:r>
+          </a:p>
+        </p:txBody>
+      </p:sp>
+      <p:pic>
+        <p:nvPicPr>
+          <p:cNvPr id="4" name="Picture 3">
+            <a:extLst>
+              <a:ext uri="{FF2B5EF4-FFF2-40B4-BE49-F238E27FC236}">
+                <a16:creationId xmlns:a16="http://schemas.microsoft.com/office/drawing/2014/main" id="{71FAA013-D4D9-13C2-01C6-B746FDC9FBE0}"/>
+              </a:ext>
+            </a:extLst>
+          </p:cNvPr>
+          <p:cNvPicPr>
+            <a:picLocks noChangeAspect="1"/>
+          </p:cNvPicPr>
+          <p:nvPr/>
+        </p:nvPicPr>
+        <p:blipFill>
+          <a:blip r:embed="rId2"/>
+          <a:stretch>
+            <a:fillRect/>
+          </a:stretch>
+        </p:blipFill>
+        <p:spPr>
+          <a:xfrm>
+            <a:off x="1290230" y="1611559"/>
+            <a:ext cx="9611540" cy="4093050"/>
+          </a:xfrm>
+          <a:prstGeom prst="rect">
+            <a:avLst/>
+          </a:prstGeom>
+        </p:spPr>
+      </p:pic>
+    </p:spTree>
+    <p:extLst>
+      <p:ext uri="{BB962C8B-B14F-4D97-AF65-F5344CB8AC3E}">
+        <p14:creationId xmlns:p14="http://schemas.microsoft.com/office/powerpoint/2010/main" val="3234654765"/>
+      </p:ext>
+    </p:extLst>
+  </p:cSld>
+  <p:clrMapOvr>
+    <a:masterClrMapping/>
+  </p:clrMapOvr>
+</p:sld>
+</file>
+
+<file path=ppt/slides/slide31.xml><?xml version="1.0" encoding="utf-8"?>
+<p:sld xmlns:a="http://schemas.openxmlformats.org/drawingml/2006/main" xmlns:r="http://schemas.openxmlformats.org/officeDocument/2006/relationships" xmlns:p="http://schemas.openxmlformats.org/presentationml/2006/main">
+  <p:cSld>
+    <p:spTree>
+      <p:nvGrpSpPr>
+        <p:cNvPr id="1" name=""/>
+        <p:cNvGrpSpPr/>
+        <p:nvPr/>
+      </p:nvGrpSpPr>
+      <p:grpSpPr>
+        <a:xfrm>
+          <a:off x="0" y="0"/>
+          <a:ext cx="0" cy="0"/>
+          <a:chOff x="0" y="0"/>
+          <a:chExt cx="0" cy="0"/>
+        </a:xfrm>
+      </p:grpSpPr>
+      <p:sp>
+        <p:nvSpPr>
+          <p:cNvPr id="2" name="Title 1">
+            <a:extLst>
+              <a:ext uri="{FF2B5EF4-FFF2-40B4-BE49-F238E27FC236}">
+                <a16:creationId xmlns:a16="http://schemas.microsoft.com/office/drawing/2014/main" id="{6A753A86-3DA3-5A9C-6240-5F9680EDEE79}"/>
+              </a:ext>
+            </a:extLst>
+          </p:cNvPr>
+          <p:cNvSpPr>
+            <a:spLocks noGrp="1"/>
+          </p:cNvSpPr>
+          <p:nvPr>
+            <p:ph type="title"/>
+          </p:nvPr>
+        </p:nvSpPr>
+        <p:spPr>
+          <a:xfrm>
+            <a:off x="838200" y="365125"/>
+            <a:ext cx="4940300" cy="1325563"/>
+          </a:xfrm>
+        </p:spPr>
+        <p:txBody>
+          <a:bodyPr>
+            <a:normAutofit fontScale="90000"/>
+          </a:bodyPr>
+          <a:lstStyle/>
+          <a:p>
+            <a:r>
+              <a:rPr lang="en-IL" dirty="0"/>
+              <a:t>Regulon activity – binarization + heatmap</a:t>
+            </a:r>
+          </a:p>
+        </p:txBody>
+      </p:sp>
+      <p:sp>
+        <p:nvSpPr>
+          <p:cNvPr id="3" name="Content Placeholder 2">
+            <a:extLst>
+              <a:ext uri="{FF2B5EF4-FFF2-40B4-BE49-F238E27FC236}">
+                <a16:creationId xmlns:a16="http://schemas.microsoft.com/office/drawing/2014/main" id="{8EF76F9C-3251-35E0-772E-CDFBD79096CA}"/>
+              </a:ext>
+            </a:extLst>
+          </p:cNvPr>
+          <p:cNvSpPr>
+            <a:spLocks noGrp="1"/>
+          </p:cNvSpPr>
+          <p:nvPr>
+            <p:ph idx="1"/>
+          </p:nvPr>
+        </p:nvSpPr>
+        <p:spPr>
+          <a:xfrm>
+            <a:off x="838200" y="1825625"/>
+            <a:ext cx="4398818" cy="4337669"/>
+          </a:xfrm>
+        </p:spPr>
+        <p:txBody>
+          <a:bodyPr>
+            <a:normAutofit/>
+          </a:bodyPr>
+          <a:lstStyle/>
+          <a:p>
+            <a:pPr marL="0" indent="0">
+              <a:buNone/>
+            </a:pPr>
+            <a:r>
+              <a:rPr lang="en-IL" sz="2000" dirty="0"/>
+              <a:t>Binarization of AUCell values with a specific threshold for every regulon</a:t>
+            </a:r>
+          </a:p>
+        </p:txBody>
+      </p:sp>
+      <p:pic>
+        <p:nvPicPr>
+          <p:cNvPr id="4" name="Picture 3">
+            <a:extLst>
+              <a:ext uri="{FF2B5EF4-FFF2-40B4-BE49-F238E27FC236}">
+                <a16:creationId xmlns:a16="http://schemas.microsoft.com/office/drawing/2014/main" id="{939B047F-6612-C652-29A3-2C6D17DE2948}"/>
+              </a:ext>
+            </a:extLst>
+          </p:cNvPr>
+          <p:cNvPicPr>
+            <a:picLocks noChangeAspect="1"/>
+          </p:cNvPicPr>
+          <p:nvPr/>
+        </p:nvPicPr>
+        <p:blipFill>
+          <a:blip r:embed="rId2"/>
+          <a:stretch>
+            <a:fillRect/>
+          </a:stretch>
+        </p:blipFill>
+        <p:spPr>
+          <a:xfrm>
+            <a:off x="5778500" y="514350"/>
+            <a:ext cx="5575300" cy="5829300"/>
+          </a:xfrm>
+          <a:prstGeom prst="rect">
+            <a:avLst/>
+          </a:prstGeom>
+        </p:spPr>
+      </p:pic>
+    </p:spTree>
+    <p:extLst>
+      <p:ext uri="{BB962C8B-B14F-4D97-AF65-F5344CB8AC3E}">
+        <p14:creationId xmlns:p14="http://schemas.microsoft.com/office/powerpoint/2010/main" val="1651139557"/>
+      </p:ext>
+    </p:extLst>
+  </p:cSld>
+  <p:clrMapOvr>
+    <a:masterClrMapping/>
+  </p:clrMapOvr>
+</p:sld>
+</file>
+
+<file path=ppt/slides/slide32.xml><?xml version="1.0" encoding="utf-8"?>
+<p:sld xmlns:a="http://schemas.openxmlformats.org/drawingml/2006/main" xmlns:r="http://schemas.openxmlformats.org/officeDocument/2006/relationships" xmlns:p="http://schemas.openxmlformats.org/presentationml/2006/main">
+  <p:cSld>
+    <p:spTree>
+      <p:nvGrpSpPr>
+        <p:cNvPr id="1" name=""/>
+        <p:cNvGrpSpPr/>
+        <p:nvPr/>
+      </p:nvGrpSpPr>
+      <p:grpSpPr>
+        <a:xfrm>
+          <a:off x="0" y="0"/>
+          <a:ext cx="0" cy="0"/>
+          <a:chOff x="0" y="0"/>
+          <a:chExt cx="0" cy="0"/>
+        </a:xfrm>
+      </p:grpSpPr>
+      <p:sp>
+        <p:nvSpPr>
+          <p:cNvPr id="2" name="Title 1">
+            <a:extLst>
+              <a:ext uri="{FF2B5EF4-FFF2-40B4-BE49-F238E27FC236}">
+                <a16:creationId xmlns:a16="http://schemas.microsoft.com/office/drawing/2014/main" id="{4A972ECA-C849-93F9-A3D3-BF2890D59703}"/>
+              </a:ext>
+            </a:extLst>
+          </p:cNvPr>
+          <p:cNvSpPr>
+            <a:spLocks noGrp="1"/>
+          </p:cNvSpPr>
+          <p:nvPr>
+            <p:ph type="title"/>
+          </p:nvPr>
+        </p:nvSpPr>
+        <p:spPr/>
+        <p:txBody>
+          <a:bodyPr/>
+          <a:lstStyle/>
+          <a:p>
+            <a:r>
+              <a:rPr lang="en-IL" dirty="0"/>
+              <a:t>Cell-type specific regulators</a:t>
+            </a:r>
+          </a:p>
+        </p:txBody>
+      </p:sp>
+      <p:sp>
+        <p:nvSpPr>
+          <p:cNvPr id="3" name="Content Placeholder 2">
+            <a:extLst>
+              <a:ext uri="{FF2B5EF4-FFF2-40B4-BE49-F238E27FC236}">
+                <a16:creationId xmlns:a16="http://schemas.microsoft.com/office/drawing/2014/main" id="{37AAC4EC-8583-8BB2-874B-407C88641CFC}"/>
+              </a:ext>
+            </a:extLst>
+          </p:cNvPr>
+          <p:cNvSpPr>
+            <a:spLocks noGrp="1"/>
+          </p:cNvSpPr>
+          <p:nvPr>
+            <p:ph idx="1"/>
+          </p:nvPr>
+        </p:nvSpPr>
+        <p:spPr/>
+        <p:txBody>
+          <a:bodyPr/>
+          <a:lstStyle/>
+          <a:p>
+            <a:r>
+              <a:rPr lang="en-IL" dirty="0"/>
+              <a:t>Regulon Specificity Score (RSS):  measures the distance between the regulon’s enrichment distribution and cell type annotations distribution using Jensen-Shannon Divergence*.</a:t>
+            </a:r>
+          </a:p>
+          <a:p>
+            <a:r>
+              <a:rPr lang="en-IL" dirty="0"/>
+              <a:t>For a cell type, RSS for all regulons is ranked from high to low (too high – outliers).</a:t>
+            </a:r>
+          </a:p>
+          <a:p>
+            <a:endParaRPr lang="en-IL" dirty="0"/>
+          </a:p>
+          <a:p>
+            <a:pPr marL="0" indent="0">
+              <a:buNone/>
+            </a:pPr>
+            <a:endParaRPr lang="en-IL" dirty="0"/>
+          </a:p>
+        </p:txBody>
+      </p:sp>
+    </p:spTree>
+    <p:extLst>
+      <p:ext uri="{BB962C8B-B14F-4D97-AF65-F5344CB8AC3E}">
+        <p14:creationId xmlns:p14="http://schemas.microsoft.com/office/powerpoint/2010/main" val="1972883681"/>
+      </p:ext>
+    </p:extLst>
+  </p:cSld>
+  <p:clrMapOvr>
+    <a:masterClrMapping/>
+  </p:clrMapOvr>
+</p:sld>
+</file>
+
 <file path=ppt/slides/slide4.xml><?xml version="1.0" encoding="utf-8"?>
 <p:sld xmlns:a="http://schemas.openxmlformats.org/drawingml/2006/main" xmlns:r="http://schemas.openxmlformats.org/officeDocument/2006/relationships" xmlns:p="http://schemas.openxmlformats.org/presentationml/2006/main">
   <p:cSld>
@@ -11521,7 +13384,7 @@
           <a:p>
             <a:r>
               <a:rPr lang="en-IL" dirty="0"/>
-              <a:t>Regression Trees for GRN inference</a:t>
+              <a:t>Advantages of Regression Trees</a:t>
             </a:r>
           </a:p>
         </p:txBody>

</xml_diff>